<commit_message>
Completed Software Testing Project, modifications to web and mobile powerpoint
</commit_message>
<xml_diff>
--- a/SWEN3004/CipherChat Presentation.pptx
+++ b/SWEN3004/CipherChat Presentation.pptx
@@ -8,17 +8,18 @@
     <p:sldId id="256" r:id="rId2"/>
     <p:sldId id="257" r:id="rId3"/>
     <p:sldId id="267" r:id="rId4"/>
-    <p:sldId id="258" r:id="rId5"/>
-    <p:sldId id="263" r:id="rId6"/>
-    <p:sldId id="260" r:id="rId7"/>
-    <p:sldId id="261" r:id="rId8"/>
-    <p:sldId id="259" r:id="rId9"/>
-    <p:sldId id="269" r:id="rId10"/>
-    <p:sldId id="268" r:id="rId11"/>
-    <p:sldId id="262" r:id="rId12"/>
-    <p:sldId id="264" r:id="rId13"/>
-    <p:sldId id="265" r:id="rId14"/>
-    <p:sldId id="266" r:id="rId15"/>
+    <p:sldId id="270" r:id="rId5"/>
+    <p:sldId id="258" r:id="rId6"/>
+    <p:sldId id="263" r:id="rId7"/>
+    <p:sldId id="260" r:id="rId8"/>
+    <p:sldId id="261" r:id="rId9"/>
+    <p:sldId id="259" r:id="rId10"/>
+    <p:sldId id="269" r:id="rId11"/>
+    <p:sldId id="268" r:id="rId12"/>
+    <p:sldId id="262" r:id="rId13"/>
+    <p:sldId id="264" r:id="rId14"/>
+    <p:sldId id="265" r:id="rId15"/>
+    <p:sldId id="266" r:id="rId16"/>
   </p:sldIdLst>
   <p:sldSz cx="9144000" cy="6858000" type="screen4x3"/>
   <p:notesSz cx="6858000" cy="9144000"/>
@@ -301,7 +302,7 @@
           <a:p>
             <a:fld id="{72E4B8C5-FDE9-40E7-A1FE-02759727A400}" type="datetimeFigureOut">
               <a:rPr lang="en-US" smtClean="0"/>
-              <a:t>5/4/2019</a:t>
+              <a:t>5/7/2019</a:t>
             </a:fld>
             <a:endParaRPr lang="en-US"/>
           </a:p>
@@ -471,7 +472,7 @@
           <a:p>
             <a:fld id="{72E4B8C5-FDE9-40E7-A1FE-02759727A400}" type="datetimeFigureOut">
               <a:rPr lang="en-US" smtClean="0"/>
-              <a:t>5/4/2019</a:t>
+              <a:t>5/7/2019</a:t>
             </a:fld>
             <a:endParaRPr lang="en-US"/>
           </a:p>
@@ -651,7 +652,7 @@
           <a:p>
             <a:fld id="{72E4B8C5-FDE9-40E7-A1FE-02759727A400}" type="datetimeFigureOut">
               <a:rPr lang="en-US" smtClean="0"/>
-              <a:t>5/4/2019</a:t>
+              <a:t>5/7/2019</a:t>
             </a:fld>
             <a:endParaRPr lang="en-US"/>
           </a:p>
@@ -821,7 +822,7 @@
           <a:p>
             <a:fld id="{72E4B8C5-FDE9-40E7-A1FE-02759727A400}" type="datetimeFigureOut">
               <a:rPr lang="en-US" smtClean="0"/>
-              <a:t>5/4/2019</a:t>
+              <a:t>5/7/2019</a:t>
             </a:fld>
             <a:endParaRPr lang="en-US"/>
           </a:p>
@@ -1067,7 +1068,7 @@
           <a:p>
             <a:fld id="{72E4B8C5-FDE9-40E7-A1FE-02759727A400}" type="datetimeFigureOut">
               <a:rPr lang="en-US" smtClean="0"/>
-              <a:t>5/4/2019</a:t>
+              <a:t>5/7/2019</a:t>
             </a:fld>
             <a:endParaRPr lang="en-US"/>
           </a:p>
@@ -1355,7 +1356,7 @@
           <a:p>
             <a:fld id="{72E4B8C5-FDE9-40E7-A1FE-02759727A400}" type="datetimeFigureOut">
               <a:rPr lang="en-US" smtClean="0"/>
-              <a:t>5/4/2019</a:t>
+              <a:t>5/7/2019</a:t>
             </a:fld>
             <a:endParaRPr lang="en-US"/>
           </a:p>
@@ -1777,7 +1778,7 @@
           <a:p>
             <a:fld id="{72E4B8C5-FDE9-40E7-A1FE-02759727A400}" type="datetimeFigureOut">
               <a:rPr lang="en-US" smtClean="0"/>
-              <a:t>5/4/2019</a:t>
+              <a:t>5/7/2019</a:t>
             </a:fld>
             <a:endParaRPr lang="en-US"/>
           </a:p>
@@ -1895,7 +1896,7 @@
           <a:p>
             <a:fld id="{72E4B8C5-FDE9-40E7-A1FE-02759727A400}" type="datetimeFigureOut">
               <a:rPr lang="en-US" smtClean="0"/>
-              <a:t>5/4/2019</a:t>
+              <a:t>5/7/2019</a:t>
             </a:fld>
             <a:endParaRPr lang="en-US"/>
           </a:p>
@@ -1990,7 +1991,7 @@
           <a:p>
             <a:fld id="{72E4B8C5-FDE9-40E7-A1FE-02759727A400}" type="datetimeFigureOut">
               <a:rPr lang="en-US" smtClean="0"/>
-              <a:t>5/4/2019</a:t>
+              <a:t>5/7/2019</a:t>
             </a:fld>
             <a:endParaRPr lang="en-US"/>
           </a:p>
@@ -2267,7 +2268,7 @@
           <a:p>
             <a:fld id="{72E4B8C5-FDE9-40E7-A1FE-02759727A400}" type="datetimeFigureOut">
               <a:rPr lang="en-US" smtClean="0"/>
-              <a:t>5/4/2019</a:t>
+              <a:t>5/7/2019</a:t>
             </a:fld>
             <a:endParaRPr lang="en-US"/>
           </a:p>
@@ -2520,7 +2521,7 @@
           <a:p>
             <a:fld id="{72E4B8C5-FDE9-40E7-A1FE-02759727A400}" type="datetimeFigureOut">
               <a:rPr lang="en-US" smtClean="0"/>
-              <a:t>5/4/2019</a:t>
+              <a:t>5/7/2019</a:t>
             </a:fld>
             <a:endParaRPr lang="en-US"/>
           </a:p>
@@ -2743,7 +2744,7 @@
           <a:p>
             <a:fld id="{72E4B8C5-FDE9-40E7-A1FE-02759727A400}" type="datetimeFigureOut">
               <a:rPr lang="en-US" smtClean="0"/>
-              <a:t>5/4/2019</a:t>
+              <a:t>5/7/2019</a:t>
             </a:fld>
             <a:endParaRPr lang="en-US"/>
           </a:p>
@@ -3430,6 +3431,212 @@
           <a:p>
             <a:pPr algn="l"/>
             <a:r>
+              <a:rPr lang="en-US" dirty="0" err="1" smtClean="0">
+                <a:solidFill>
+                  <a:schemeClr val="bg1"/>
+                </a:solidFill>
+              </a:rPr>
+              <a:t>Diffie</a:t>
+            </a:r>
+            <a:r>
+              <a:rPr lang="en-US" dirty="0" smtClean="0">
+                <a:solidFill>
+                  <a:schemeClr val="bg1"/>
+                </a:solidFill>
+              </a:rPr>
+              <a:t> Hellman </a:t>
+            </a:r>
+            <a:r>
+              <a:rPr lang="en-US" dirty="0" err="1" smtClean="0">
+                <a:solidFill>
+                  <a:schemeClr val="bg1"/>
+                </a:solidFill>
+              </a:rPr>
+              <a:t>Vulnurability</a:t>
+            </a:r>
+            <a:endParaRPr lang="en-US" dirty="0">
+              <a:solidFill>
+                <a:schemeClr val="bg1"/>
+              </a:solidFill>
+            </a:endParaRPr>
+          </a:p>
+        </p:txBody>
+      </p:sp>
+      <p:sp>
+        <p:nvSpPr>
+          <p:cNvPr id="3" name="Subtitle 2"/>
+          <p:cNvSpPr>
+            <a:spLocks noGrp="1"/>
+          </p:cNvSpPr>
+          <p:nvPr>
+            <p:ph type="subTitle" idx="1"/>
+          </p:nvPr>
+        </p:nvSpPr>
+        <p:spPr>
+          <a:xfrm>
+            <a:off x="228600" y="1447800"/>
+            <a:ext cx="8915400" cy="4953000"/>
+          </a:xfrm>
+        </p:spPr>
+        <p:txBody>
+          <a:bodyPr>
+            <a:normAutofit lnSpcReduction="10000"/>
+          </a:bodyPr>
+          <a:lstStyle/>
+          <a:p>
+            <a:pPr algn="l"/>
+            <a:r>
+              <a:rPr lang="en-US" sz="3100" dirty="0" smtClean="0">
+                <a:solidFill>
+                  <a:schemeClr val="bg1"/>
+                </a:solidFill>
+              </a:rPr>
+              <a:t>Although </a:t>
+            </a:r>
+            <a:r>
+              <a:rPr lang="en-US" sz="3100" dirty="0" err="1" smtClean="0">
+                <a:solidFill>
+                  <a:schemeClr val="bg1"/>
+                </a:solidFill>
+              </a:rPr>
+              <a:t>Diffie</a:t>
+            </a:r>
+            <a:r>
+              <a:rPr lang="en-US" sz="3100" dirty="0" smtClean="0">
+                <a:solidFill>
+                  <a:schemeClr val="bg1"/>
+                </a:solidFill>
+              </a:rPr>
+              <a:t> Hellman can defend against passive attackers it is vulnerable to </a:t>
+            </a:r>
+            <a:r>
+              <a:rPr lang="en-US" sz="3100" u="sng" dirty="0" smtClean="0">
+                <a:solidFill>
+                  <a:schemeClr val="bg1"/>
+                </a:solidFill>
+              </a:rPr>
+              <a:t>Man in the Middle Attack</a:t>
+            </a:r>
+            <a:r>
+              <a:rPr lang="en-US" sz="3100" dirty="0" smtClean="0">
+                <a:solidFill>
+                  <a:schemeClr val="bg1"/>
+                </a:solidFill>
+              </a:rPr>
+              <a:t>. In this case the server may function as two or more separate peers, decrypting and re-encrypting message before sending them to the intended recipient.</a:t>
+            </a:r>
+          </a:p>
+          <a:p>
+            <a:pPr algn="l"/>
+            <a:r>
+              <a:rPr lang="en-US" sz="3100" u="sng" dirty="0" smtClean="0">
+                <a:solidFill>
+                  <a:schemeClr val="bg1"/>
+                </a:solidFill>
+              </a:rPr>
+              <a:t>Current Solution</a:t>
+            </a:r>
+            <a:endParaRPr lang="en-US" sz="3100" dirty="0" smtClean="0">
+              <a:solidFill>
+                <a:schemeClr val="bg1"/>
+              </a:solidFill>
+            </a:endParaRPr>
+          </a:p>
+          <a:p>
+            <a:pPr marL="514350" indent="-514350" algn="l">
+              <a:buAutoNum type="arabicPeriod"/>
+            </a:pPr>
+            <a:r>
+              <a:rPr lang="en-US" sz="3100" dirty="0" smtClean="0">
+                <a:solidFill>
+                  <a:schemeClr val="bg1"/>
+                </a:solidFill>
+              </a:rPr>
+              <a:t>Host and use your own server</a:t>
+            </a:r>
+          </a:p>
+          <a:p>
+            <a:pPr algn="l"/>
+            <a:endParaRPr lang="en-US" sz="3100" dirty="0" smtClean="0">
+              <a:solidFill>
+                <a:schemeClr val="bg1"/>
+              </a:solidFill>
+            </a:endParaRPr>
+          </a:p>
+          <a:p>
+            <a:pPr algn="l"/>
+            <a:r>
+              <a:rPr lang="en-US" sz="3100" dirty="0" smtClean="0">
+                <a:solidFill>
+                  <a:schemeClr val="bg1"/>
+                </a:solidFill>
+              </a:rPr>
+              <a:t>This vulnerability will addressed later in this presentation</a:t>
+            </a:r>
+          </a:p>
+        </p:txBody>
+      </p:sp>
+    </p:spTree>
+    <p:extLst>
+      <p:ext uri="{BB962C8B-B14F-4D97-AF65-F5344CB8AC3E}">
+        <p14:creationId xmlns:p14="http://schemas.microsoft.com/office/powerpoint/2010/main" val="3161049883"/>
+      </p:ext>
+    </p:extLst>
+  </p:cSld>
+  <p:clrMapOvr>
+    <a:masterClrMapping/>
+  </p:clrMapOvr>
+  <p:timing>
+    <p:tnLst>
+      <p:par>
+        <p:cTn id="1" dur="indefinite" restart="never" nodeType="tmRoot"/>
+      </p:par>
+    </p:tnLst>
+  </p:timing>
+</p:sld>
+</file>
+
+<file path=ppt/slides/slide11.xml><?xml version="1.0" encoding="utf-8"?>
+<p:sld xmlns:a="http://schemas.openxmlformats.org/drawingml/2006/main" xmlns:r="http://schemas.openxmlformats.org/officeDocument/2006/relationships" xmlns:p="http://schemas.openxmlformats.org/presentationml/2006/main">
+  <p:cSld>
+    <p:spTree>
+      <p:nvGrpSpPr>
+        <p:cNvPr id="1" name=""/>
+        <p:cNvGrpSpPr/>
+        <p:nvPr/>
+      </p:nvGrpSpPr>
+      <p:grpSpPr>
+        <a:xfrm>
+          <a:off x="0" y="0"/>
+          <a:ext cx="0" cy="0"/>
+          <a:chOff x="0" y="0"/>
+          <a:chExt cx="0" cy="0"/>
+        </a:xfrm>
+      </p:grpSpPr>
+      <p:sp>
+        <p:nvSpPr>
+          <p:cNvPr id="2" name="Title 1"/>
+          <p:cNvSpPr>
+            <a:spLocks noGrp="1"/>
+          </p:cNvSpPr>
+          <p:nvPr>
+            <p:ph type="ctrTitle"/>
+          </p:nvPr>
+        </p:nvSpPr>
+        <p:spPr>
+          <a:xfrm>
+            <a:off x="304800" y="152400"/>
+            <a:ext cx="8610600" cy="1447800"/>
+          </a:xfrm>
+        </p:spPr>
+        <p:txBody>
+          <a:bodyPr>
+            <a:normAutofit/>
+          </a:bodyPr>
+          <a:lstStyle/>
+          <a:p>
+            <a:pPr algn="l"/>
+            <a:r>
               <a:rPr lang="en-US" dirty="0" smtClean="0">
                 <a:solidFill>
                   <a:schemeClr val="bg1"/>
@@ -3639,252 +3846,6 @@
 </p:sld>
 </file>
 
-<file path=ppt/slides/slide11.xml><?xml version="1.0" encoding="utf-8"?>
-<p:sld xmlns:a="http://schemas.openxmlformats.org/drawingml/2006/main" xmlns:r="http://schemas.openxmlformats.org/officeDocument/2006/relationships" xmlns:p="http://schemas.openxmlformats.org/presentationml/2006/main">
-  <p:cSld>
-    <p:spTree>
-      <p:nvGrpSpPr>
-        <p:cNvPr id="1" name=""/>
-        <p:cNvGrpSpPr/>
-        <p:nvPr/>
-      </p:nvGrpSpPr>
-      <p:grpSpPr>
-        <a:xfrm>
-          <a:off x="0" y="0"/>
-          <a:ext cx="0" cy="0"/>
-          <a:chOff x="0" y="0"/>
-          <a:chExt cx="0" cy="0"/>
-        </a:xfrm>
-      </p:grpSpPr>
-      <p:sp>
-        <p:nvSpPr>
-          <p:cNvPr id="2" name="Title 1"/>
-          <p:cNvSpPr>
-            <a:spLocks noGrp="1"/>
-          </p:cNvSpPr>
-          <p:nvPr>
-            <p:ph type="ctrTitle"/>
-          </p:nvPr>
-        </p:nvSpPr>
-        <p:spPr>
-          <a:xfrm>
-            <a:off x="304800" y="152400"/>
-            <a:ext cx="8610600" cy="1447800"/>
-          </a:xfrm>
-        </p:spPr>
-        <p:txBody>
-          <a:bodyPr>
-            <a:normAutofit/>
-          </a:bodyPr>
-          <a:lstStyle/>
-          <a:p>
-            <a:pPr algn="l"/>
-            <a:r>
-              <a:rPr lang="en-US" dirty="0" smtClean="0">
-                <a:solidFill>
-                  <a:schemeClr val="bg1"/>
-                </a:solidFill>
-              </a:rPr>
-              <a:t>Open Source</a:t>
-            </a:r>
-            <a:endParaRPr lang="en-US" dirty="0">
-              <a:solidFill>
-                <a:schemeClr val="bg1"/>
-              </a:solidFill>
-            </a:endParaRPr>
-          </a:p>
-        </p:txBody>
-      </p:sp>
-      <p:sp>
-        <p:nvSpPr>
-          <p:cNvPr id="3" name="Subtitle 2"/>
-          <p:cNvSpPr>
-            <a:spLocks noGrp="1"/>
-          </p:cNvSpPr>
-          <p:nvPr>
-            <p:ph type="subTitle" idx="1"/>
-          </p:nvPr>
-        </p:nvSpPr>
-        <p:spPr>
-          <a:xfrm>
-            <a:off x="304800" y="1295400"/>
-            <a:ext cx="8534400" cy="5181600"/>
-          </a:xfrm>
-        </p:spPr>
-        <p:txBody>
-          <a:bodyPr>
-            <a:normAutofit fontScale="92500" lnSpcReduction="10000"/>
-          </a:bodyPr>
-          <a:lstStyle/>
-          <a:p>
-            <a:pPr algn="l"/>
-            <a:r>
-              <a:rPr lang="en-US" sz="3100" u="sng" dirty="0" smtClean="0">
-                <a:solidFill>
-                  <a:schemeClr val="bg1"/>
-                </a:solidFill>
-              </a:rPr>
-              <a:t>Food for Thought</a:t>
-            </a:r>
-          </a:p>
-          <a:p>
-            <a:pPr marL="514350" indent="-514350" algn="l">
-              <a:buFont typeface="+mj-lt"/>
-              <a:buAutoNum type="arabicPeriod"/>
-            </a:pPr>
-            <a:r>
-              <a:rPr lang="en-US" sz="3100" dirty="0" smtClean="0">
-                <a:solidFill>
-                  <a:schemeClr val="bg1"/>
-                </a:solidFill>
-              </a:rPr>
-              <a:t>Why should anyone trust applications if they cannot prove for themselves that it is secure?</a:t>
-            </a:r>
-          </a:p>
-          <a:p>
-            <a:pPr marL="514350" indent="-514350" algn="l">
-              <a:buFont typeface="+mj-lt"/>
-              <a:buAutoNum type="arabicPeriod"/>
-            </a:pPr>
-            <a:r>
-              <a:rPr lang="en-US" sz="3100" dirty="0" smtClean="0">
-                <a:solidFill>
-                  <a:schemeClr val="bg1"/>
-                </a:solidFill>
-              </a:rPr>
-              <a:t>Applications </a:t>
-            </a:r>
-            <a:r>
-              <a:rPr lang="en-US" sz="3100" dirty="0">
-                <a:solidFill>
-                  <a:schemeClr val="bg1"/>
-                </a:solidFill>
-              </a:rPr>
-              <a:t>should </a:t>
-            </a:r>
-            <a:r>
-              <a:rPr lang="en-US" sz="3100" dirty="0" smtClean="0">
-                <a:solidFill>
-                  <a:schemeClr val="bg1"/>
-                </a:solidFill>
-              </a:rPr>
-              <a:t>be secure by design and not by policy!</a:t>
-            </a:r>
-          </a:p>
-          <a:p>
-            <a:pPr marL="514350" indent="-514350" algn="l">
-              <a:buFont typeface="+mj-lt"/>
-              <a:buAutoNum type="arabicPeriod"/>
-            </a:pPr>
-            <a:endParaRPr lang="en-US" sz="3100" dirty="0" smtClean="0">
-              <a:solidFill>
-                <a:schemeClr val="bg1"/>
-              </a:solidFill>
-            </a:endParaRPr>
-          </a:p>
-          <a:p>
-            <a:pPr algn="l"/>
-            <a:r>
-              <a:rPr lang="en-US" sz="3100" dirty="0" err="1" smtClean="0">
-                <a:solidFill>
-                  <a:schemeClr val="bg1"/>
-                </a:solidFill>
-              </a:rPr>
-              <a:t>CipherChat</a:t>
-            </a:r>
-            <a:r>
-              <a:rPr lang="en-US" sz="3100" dirty="0" smtClean="0">
-                <a:solidFill>
-                  <a:schemeClr val="bg1"/>
-                </a:solidFill>
-              </a:rPr>
-              <a:t> is </a:t>
-            </a:r>
-            <a:r>
-              <a:rPr lang="en-US" sz="3100" dirty="0" smtClean="0">
-                <a:solidFill>
-                  <a:schemeClr val="bg1"/>
-                </a:solidFill>
-              </a:rPr>
-              <a:t>Open </a:t>
-            </a:r>
-            <a:r>
-              <a:rPr lang="en-US" sz="3100" dirty="0" smtClean="0">
-                <a:solidFill>
-                  <a:schemeClr val="bg1"/>
-                </a:solidFill>
-              </a:rPr>
-              <a:t>Source. </a:t>
-            </a:r>
-            <a:r>
-              <a:rPr lang="en-US" sz="3100" dirty="0" smtClean="0">
-                <a:solidFill>
-                  <a:schemeClr val="bg1"/>
-                </a:solidFill>
-              </a:rPr>
-              <a:t>By design, </a:t>
-            </a:r>
-            <a:r>
-              <a:rPr lang="en-US" sz="3100" dirty="0" err="1" smtClean="0">
-                <a:solidFill>
-                  <a:schemeClr val="bg1"/>
-                </a:solidFill>
-              </a:rPr>
-              <a:t>CipherChat</a:t>
-            </a:r>
-            <a:r>
-              <a:rPr lang="en-US" sz="3100" dirty="0" smtClean="0">
-                <a:solidFill>
-                  <a:schemeClr val="bg1"/>
-                </a:solidFill>
-              </a:rPr>
-              <a:t> is trustless if a known server is used for each conversation (else MITM vulnerability) and will evolve to be trustless regardless of which server is used.</a:t>
-            </a:r>
-            <a:br>
-              <a:rPr lang="en-US" sz="3100" dirty="0" smtClean="0">
-                <a:solidFill>
-                  <a:schemeClr val="bg1"/>
-                </a:solidFill>
-              </a:rPr>
-            </a:br>
-            <a:endParaRPr lang="en-US" sz="900" dirty="0" smtClean="0">
-              <a:solidFill>
-                <a:schemeClr val="bg1"/>
-              </a:solidFill>
-            </a:endParaRPr>
-          </a:p>
-          <a:p>
-            <a:r>
-              <a:rPr lang="en-US" sz="3100" dirty="0">
-                <a:solidFill>
-                  <a:schemeClr val="bg1"/>
-                </a:solidFill>
-              </a:rPr>
-              <a:t>https://github.com/CipherChat/CipherChat/</a:t>
-            </a:r>
-          </a:p>
-        </p:txBody>
-      </p:sp>
-    </p:spTree>
-    <p:extLst>
-      <p:ext uri="{BB962C8B-B14F-4D97-AF65-F5344CB8AC3E}">
-        <p14:creationId xmlns:p14="http://schemas.microsoft.com/office/powerpoint/2010/main" val="1616725130"/>
-      </p:ext>
-    </p:extLst>
-  </p:cSld>
-  <p:clrMapOvr>
-    <a:masterClrMapping/>
-  </p:clrMapOvr>
-  <p:timing>
-    <p:tnLst>
-      <p:par>
-        <p:cTn id="1" dur="indefinite" restart="never" nodeType="tmRoot"/>
-      </p:par>
-    </p:tnLst>
-  </p:timing>
-</p:sld>
-</file>
-
 <file path=ppt/slides/slide12.xml><?xml version="1.0" encoding="utf-8"?>
 <p:sld xmlns:a="http://schemas.openxmlformats.org/drawingml/2006/main" xmlns:r="http://schemas.openxmlformats.org/officeDocument/2006/relationships" xmlns:p="http://schemas.openxmlformats.org/presentationml/2006/main">
   <p:cSld>
@@ -3914,8 +3875,8 @@
         </p:nvSpPr>
         <p:spPr>
           <a:xfrm>
-            <a:off x="0" y="2514600"/>
-            <a:ext cx="9144000" cy="1447800"/>
+            <a:off x="304800" y="152400"/>
+            <a:ext cx="8610600" cy="1447800"/>
           </a:xfrm>
         </p:spPr>
         <p:txBody>
@@ -3924,13 +3885,14 @@
           </a:bodyPr>
           <a:lstStyle/>
           <a:p>
+            <a:pPr algn="l"/>
             <a:r>
               <a:rPr lang="en-US" dirty="0" smtClean="0">
                 <a:solidFill>
                   <a:schemeClr val="bg1"/>
                 </a:solidFill>
               </a:rPr>
-              <a:t>Live Demonstration</a:t>
+              <a:t>Open Source</a:t>
             </a:r>
             <a:endParaRPr lang="en-US" dirty="0">
               <a:solidFill>
@@ -3940,10 +3902,156 @@
           </a:p>
         </p:txBody>
       </p:sp>
+      <p:sp>
+        <p:nvSpPr>
+          <p:cNvPr id="3" name="Subtitle 2"/>
+          <p:cNvSpPr>
+            <a:spLocks noGrp="1"/>
+          </p:cNvSpPr>
+          <p:nvPr>
+            <p:ph type="subTitle" idx="1"/>
+          </p:nvPr>
+        </p:nvSpPr>
+        <p:spPr>
+          <a:xfrm>
+            <a:off x="304800" y="1295400"/>
+            <a:ext cx="8534400" cy="5181600"/>
+          </a:xfrm>
+        </p:spPr>
+        <p:txBody>
+          <a:bodyPr>
+            <a:normAutofit fontScale="92500" lnSpcReduction="10000"/>
+          </a:bodyPr>
+          <a:lstStyle/>
+          <a:p>
+            <a:pPr algn="l"/>
+            <a:r>
+              <a:rPr lang="en-US" sz="3100" u="sng" dirty="0" smtClean="0">
+                <a:solidFill>
+                  <a:schemeClr val="bg1"/>
+                </a:solidFill>
+              </a:rPr>
+              <a:t>Food for Thought</a:t>
+            </a:r>
+          </a:p>
+          <a:p>
+            <a:pPr marL="514350" indent="-514350" algn="l">
+              <a:buFont typeface="+mj-lt"/>
+              <a:buAutoNum type="arabicPeriod"/>
+            </a:pPr>
+            <a:r>
+              <a:rPr lang="en-US" sz="3100" dirty="0" smtClean="0">
+                <a:solidFill>
+                  <a:schemeClr val="bg1"/>
+                </a:solidFill>
+              </a:rPr>
+              <a:t>Why should anyone trust applications if they cannot prove for themselves that it is secure?</a:t>
+            </a:r>
+          </a:p>
+          <a:p>
+            <a:pPr marL="514350" indent="-514350" algn="l">
+              <a:buFont typeface="+mj-lt"/>
+              <a:buAutoNum type="arabicPeriod"/>
+            </a:pPr>
+            <a:r>
+              <a:rPr lang="en-US" sz="3100" dirty="0" smtClean="0">
+                <a:solidFill>
+                  <a:schemeClr val="bg1"/>
+                </a:solidFill>
+              </a:rPr>
+              <a:t>Applications </a:t>
+            </a:r>
+            <a:r>
+              <a:rPr lang="en-US" sz="3100" dirty="0">
+                <a:solidFill>
+                  <a:schemeClr val="bg1"/>
+                </a:solidFill>
+              </a:rPr>
+              <a:t>should </a:t>
+            </a:r>
+            <a:r>
+              <a:rPr lang="en-US" sz="3100" dirty="0" smtClean="0">
+                <a:solidFill>
+                  <a:schemeClr val="bg1"/>
+                </a:solidFill>
+              </a:rPr>
+              <a:t>be secure by design and not by policy!</a:t>
+            </a:r>
+          </a:p>
+          <a:p>
+            <a:pPr marL="514350" indent="-514350" algn="l">
+              <a:buFont typeface="+mj-lt"/>
+              <a:buAutoNum type="arabicPeriod"/>
+            </a:pPr>
+            <a:endParaRPr lang="en-US" sz="3100" dirty="0" smtClean="0">
+              <a:solidFill>
+                <a:schemeClr val="bg1"/>
+              </a:solidFill>
+            </a:endParaRPr>
+          </a:p>
+          <a:p>
+            <a:pPr algn="l"/>
+            <a:r>
+              <a:rPr lang="en-US" sz="3100" dirty="0" err="1" smtClean="0">
+                <a:solidFill>
+                  <a:schemeClr val="bg1"/>
+                </a:solidFill>
+              </a:rPr>
+              <a:t>CipherChat</a:t>
+            </a:r>
+            <a:r>
+              <a:rPr lang="en-US" sz="3100" dirty="0" smtClean="0">
+                <a:solidFill>
+                  <a:schemeClr val="bg1"/>
+                </a:solidFill>
+              </a:rPr>
+              <a:t> is Open Source. By design, </a:t>
+            </a:r>
+            <a:r>
+              <a:rPr lang="en-US" sz="3100" dirty="0" err="1" smtClean="0">
+                <a:solidFill>
+                  <a:schemeClr val="bg1"/>
+                </a:solidFill>
+              </a:rPr>
+              <a:t>CipherChat</a:t>
+            </a:r>
+            <a:r>
+              <a:rPr lang="en-US" sz="3100" dirty="0" smtClean="0">
+                <a:solidFill>
+                  <a:schemeClr val="bg1"/>
+                </a:solidFill>
+              </a:rPr>
+              <a:t> is trustless if a known server is used for each conversation (else MITM vulnerability) and will evolve to be trustless regardless of which server is used.</a:t>
+            </a:r>
+            <a:br>
+              <a:rPr lang="en-US" sz="3100" dirty="0" smtClean="0">
+                <a:solidFill>
+                  <a:schemeClr val="bg1"/>
+                </a:solidFill>
+              </a:rPr>
+            </a:br>
+            <a:endParaRPr lang="en-US" sz="900" dirty="0" smtClean="0">
+              <a:solidFill>
+                <a:schemeClr val="bg1"/>
+              </a:solidFill>
+            </a:endParaRPr>
+          </a:p>
+          <a:p>
+            <a:r>
+              <a:rPr lang="en-US" sz="3100" dirty="0">
+                <a:solidFill>
+                  <a:schemeClr val="bg1"/>
+                </a:solidFill>
+              </a:rPr>
+              <a:t>https://github.com/CipherChat/CipherChat/</a:t>
+            </a:r>
+          </a:p>
+        </p:txBody>
+      </p:sp>
     </p:spTree>
     <p:extLst>
       <p:ext uri="{BB962C8B-B14F-4D97-AF65-F5344CB8AC3E}">
-        <p14:creationId xmlns:p14="http://schemas.microsoft.com/office/powerpoint/2010/main" val="2589255197"/>
+        <p14:creationId xmlns:p14="http://schemas.microsoft.com/office/powerpoint/2010/main" val="1616725130"/>
       </p:ext>
     </p:extLst>
   </p:cSld>
@@ -3989,8 +4097,8 @@
         </p:nvSpPr>
         <p:spPr>
           <a:xfrm>
-            <a:off x="304800" y="152400"/>
-            <a:ext cx="8610600" cy="1447800"/>
+            <a:off x="0" y="2514600"/>
+            <a:ext cx="9144000" cy="1447800"/>
           </a:xfrm>
         </p:spPr>
         <p:txBody>
@@ -3999,14 +4107,13 @@
           </a:bodyPr>
           <a:lstStyle/>
           <a:p>
-            <a:pPr algn="l"/>
             <a:r>
               <a:rPr lang="en-US" dirty="0" smtClean="0">
                 <a:solidFill>
                   <a:schemeClr val="bg1"/>
                 </a:solidFill>
               </a:rPr>
-              <a:t>Future Improvements</a:t>
+              <a:t>Live Demonstration</a:t>
             </a:r>
             <a:endParaRPr lang="en-US" dirty="0">
               <a:solidFill>
@@ -4016,298 +4123,10 @@
           </a:p>
         </p:txBody>
       </p:sp>
-      <p:sp>
-        <p:nvSpPr>
-          <p:cNvPr id="3" name="Subtitle 2"/>
-          <p:cNvSpPr>
-            <a:spLocks noGrp="1"/>
-          </p:cNvSpPr>
-          <p:nvPr>
-            <p:ph type="subTitle" idx="1"/>
-          </p:nvPr>
-        </p:nvSpPr>
-        <p:spPr>
-          <a:xfrm>
-            <a:off x="304800" y="1219200"/>
-            <a:ext cx="8839200" cy="5410200"/>
-          </a:xfrm>
-        </p:spPr>
-        <p:txBody>
-          <a:bodyPr>
-            <a:normAutofit fontScale="85000" lnSpcReduction="20000"/>
-          </a:bodyPr>
-          <a:lstStyle/>
-          <a:p>
-            <a:pPr marL="514350" indent="-514350" algn="l">
-              <a:buFont typeface="+mj-lt"/>
-              <a:buAutoNum type="arabicPeriod"/>
-            </a:pPr>
-            <a:r>
-              <a:rPr lang="en-US" sz="3100" dirty="0" smtClean="0">
-                <a:solidFill>
-                  <a:schemeClr val="bg1"/>
-                </a:solidFill>
-              </a:rPr>
-              <a:t>Use of </a:t>
-            </a:r>
-            <a:r>
-              <a:rPr lang="en-US" sz="3100" dirty="0" err="1">
-                <a:solidFill>
-                  <a:schemeClr val="bg1"/>
-                </a:solidFill>
-              </a:rPr>
-              <a:t>w</a:t>
-            </a:r>
-            <a:r>
-              <a:rPr lang="en-US" sz="3100" dirty="0" err="1" smtClean="0">
-                <a:solidFill>
-                  <a:schemeClr val="bg1"/>
-                </a:solidFill>
-              </a:rPr>
-              <a:t>ebsockets</a:t>
-            </a:r>
-            <a:r>
-              <a:rPr lang="en-US" sz="3100" dirty="0" smtClean="0">
-                <a:solidFill>
-                  <a:schemeClr val="bg1"/>
-                </a:solidFill>
-              </a:rPr>
-              <a:t> instead of polling</a:t>
-            </a:r>
-          </a:p>
-          <a:p>
-            <a:pPr marL="514350" indent="-514350" algn="l">
-              <a:buFont typeface="+mj-lt"/>
-              <a:buAutoNum type="arabicPeriod"/>
-            </a:pPr>
-            <a:r>
-              <a:rPr lang="en-US" sz="3100" dirty="0" smtClean="0">
-                <a:solidFill>
-                  <a:schemeClr val="bg1"/>
-                </a:solidFill>
-              </a:rPr>
-              <a:t>Restrict Public Key Exchange to face-to-face interaction only</a:t>
-            </a:r>
-            <a:endParaRPr lang="en-US" sz="3100" dirty="0">
-              <a:solidFill>
-                <a:schemeClr val="bg1"/>
-              </a:solidFill>
-            </a:endParaRPr>
-          </a:p>
-          <a:p>
-            <a:pPr marL="514350" indent="-514350" algn="l">
-              <a:buFont typeface="+mj-lt"/>
-              <a:buAutoNum type="arabicPeriod"/>
-            </a:pPr>
-            <a:r>
-              <a:rPr lang="en-US" sz="3100" dirty="0" smtClean="0">
-                <a:solidFill>
-                  <a:schemeClr val="bg1"/>
-                </a:solidFill>
-              </a:rPr>
-              <a:t>Create </a:t>
-            </a:r>
-            <a:r>
-              <a:rPr lang="en-US" sz="3100" dirty="0">
-                <a:solidFill>
-                  <a:schemeClr val="bg1"/>
-                </a:solidFill>
-              </a:rPr>
-              <a:t>more incentives for person to host their own </a:t>
-            </a:r>
-            <a:r>
-              <a:rPr lang="en-US" sz="3100" dirty="0" err="1">
-                <a:solidFill>
-                  <a:schemeClr val="bg1"/>
-                </a:solidFill>
-              </a:rPr>
-              <a:t>CipherChat</a:t>
-            </a:r>
-            <a:r>
-              <a:rPr lang="en-US" sz="3100" dirty="0">
-                <a:solidFill>
-                  <a:schemeClr val="bg1"/>
-                </a:solidFill>
-              </a:rPr>
-              <a:t> </a:t>
-            </a:r>
-            <a:r>
-              <a:rPr lang="en-US" sz="3100" dirty="0" smtClean="0">
-                <a:solidFill>
-                  <a:schemeClr val="bg1"/>
-                </a:solidFill>
-              </a:rPr>
-              <a:t>servers</a:t>
-            </a:r>
-          </a:p>
-          <a:p>
-            <a:pPr marL="514350" indent="-514350" algn="l">
-              <a:buFont typeface="+mj-lt"/>
-              <a:buAutoNum type="arabicPeriod"/>
-            </a:pPr>
-            <a:r>
-              <a:rPr lang="en-US" sz="3100" dirty="0" smtClean="0">
-                <a:solidFill>
-                  <a:schemeClr val="bg1"/>
-                </a:solidFill>
-              </a:rPr>
-              <a:t>Notifications</a:t>
-            </a:r>
-          </a:p>
-          <a:p>
-            <a:pPr marL="514350" indent="-514350" algn="l">
-              <a:buFont typeface="+mj-lt"/>
-              <a:buAutoNum type="arabicPeriod"/>
-            </a:pPr>
-            <a:r>
-              <a:rPr lang="en-US" sz="3100" dirty="0" smtClean="0">
-                <a:solidFill>
-                  <a:schemeClr val="bg1"/>
-                </a:solidFill>
-              </a:rPr>
-              <a:t>Make app multilingual</a:t>
-            </a:r>
-          </a:p>
-          <a:p>
-            <a:pPr marL="514350" indent="-514350" algn="l">
-              <a:buFont typeface="+mj-lt"/>
-              <a:buAutoNum type="arabicPeriod"/>
-            </a:pPr>
-            <a:r>
-              <a:rPr lang="en-US" sz="3100" dirty="0" smtClean="0">
-                <a:solidFill>
-                  <a:schemeClr val="bg1"/>
-                </a:solidFill>
-              </a:rPr>
-              <a:t>Allow </a:t>
-            </a:r>
-            <a:r>
-              <a:rPr lang="en-US" sz="3100" dirty="0">
-                <a:solidFill>
-                  <a:schemeClr val="bg1"/>
-                </a:solidFill>
-              </a:rPr>
-              <a:t>for the parsing of more complex data such as images and </a:t>
-            </a:r>
-            <a:r>
-              <a:rPr lang="en-US" sz="3100" dirty="0" smtClean="0">
-                <a:solidFill>
-                  <a:schemeClr val="bg1"/>
-                </a:solidFill>
-              </a:rPr>
-              <a:t>videos</a:t>
-            </a:r>
-          </a:p>
-          <a:p>
-            <a:pPr algn="l"/>
-            <a:endParaRPr lang="en-US" sz="1600" dirty="0">
-              <a:solidFill>
-                <a:schemeClr val="bg1"/>
-              </a:solidFill>
-            </a:endParaRPr>
-          </a:p>
-          <a:p>
-            <a:pPr algn="l"/>
-            <a:r>
-              <a:rPr lang="en-US" sz="3100" u="sng" dirty="0" smtClean="0">
-                <a:solidFill>
-                  <a:schemeClr val="bg1"/>
-                </a:solidFill>
-              </a:rPr>
-              <a:t>Distant Future</a:t>
-            </a:r>
-          </a:p>
-          <a:p>
-            <a:pPr marL="514350" indent="-514350" algn="l">
-              <a:buFont typeface="+mj-lt"/>
-              <a:buAutoNum type="arabicPeriod"/>
-            </a:pPr>
-            <a:r>
-              <a:rPr lang="en-US" sz="3100" dirty="0" smtClean="0">
-                <a:solidFill>
-                  <a:schemeClr val="bg1"/>
-                </a:solidFill>
-              </a:rPr>
-              <a:t>Facilitate the </a:t>
-            </a:r>
-            <a:r>
-              <a:rPr lang="en-US" sz="3100" dirty="0">
-                <a:solidFill>
-                  <a:schemeClr val="bg1"/>
-                </a:solidFill>
-              </a:rPr>
-              <a:t>sending of </a:t>
-            </a:r>
-            <a:r>
-              <a:rPr lang="en-US" sz="3100" dirty="0" smtClean="0">
-                <a:solidFill>
-                  <a:schemeClr val="bg1"/>
-                </a:solidFill>
-              </a:rPr>
-              <a:t>any currency (using crypto)</a:t>
-            </a:r>
-          </a:p>
-          <a:p>
-            <a:pPr marL="514350" indent="-514350" algn="l">
-              <a:buFont typeface="+mj-lt"/>
-              <a:buAutoNum type="arabicPeriod"/>
-            </a:pPr>
-            <a:r>
-              <a:rPr lang="en-US" sz="3100" dirty="0" err="1" smtClean="0">
-                <a:solidFill>
-                  <a:schemeClr val="bg1"/>
-                </a:solidFill>
-              </a:rPr>
-              <a:t>Blockchain</a:t>
-            </a:r>
-            <a:endParaRPr lang="en-US" sz="3100" dirty="0">
-              <a:solidFill>
-                <a:schemeClr val="bg1"/>
-              </a:solidFill>
-            </a:endParaRPr>
-          </a:p>
-          <a:p>
-            <a:pPr marL="514350" indent="-514350" algn="l">
-              <a:buFont typeface="+mj-lt"/>
-              <a:buAutoNum type="arabicPeriod"/>
-            </a:pPr>
-            <a:r>
-              <a:rPr lang="en-US" sz="3100" dirty="0" smtClean="0">
-                <a:solidFill>
-                  <a:schemeClr val="bg1"/>
-                </a:solidFill>
-              </a:rPr>
-              <a:t>Free Decentralized Applets (Cab Hailing, Package Delivery etc.)</a:t>
-            </a:r>
-          </a:p>
-          <a:p>
-            <a:pPr marL="514350" indent="-514350" algn="l">
-              <a:buFont typeface="+mj-lt"/>
-              <a:buAutoNum type="arabicPeriod"/>
-            </a:pPr>
-            <a:endParaRPr lang="en-US" sz="3100" dirty="0" smtClean="0">
-              <a:solidFill>
-                <a:schemeClr val="bg1"/>
-              </a:solidFill>
-            </a:endParaRPr>
-          </a:p>
-          <a:p>
-            <a:pPr marL="514350" indent="-514350" algn="l">
-              <a:buFont typeface="+mj-lt"/>
-              <a:buAutoNum type="arabicPeriod"/>
-            </a:pPr>
-            <a:endParaRPr lang="en-US" sz="3100" dirty="0" smtClean="0">
-              <a:solidFill>
-                <a:schemeClr val="bg1"/>
-              </a:solidFill>
-            </a:endParaRPr>
-          </a:p>
-        </p:txBody>
-      </p:sp>
     </p:spTree>
     <p:extLst>
       <p:ext uri="{BB962C8B-B14F-4D97-AF65-F5344CB8AC3E}">
-        <p14:creationId xmlns:p14="http://schemas.microsoft.com/office/powerpoint/2010/main" val="1032352236"/>
+        <p14:creationId xmlns:p14="http://schemas.microsoft.com/office/powerpoint/2010/main" val="2589255197"/>
       </p:ext>
     </p:extLst>
   </p:cSld>
@@ -4353,6 +4172,354 @@
         </p:nvSpPr>
         <p:spPr>
           <a:xfrm>
+            <a:off x="304800" y="152400"/>
+            <a:ext cx="8610600" cy="1447800"/>
+          </a:xfrm>
+        </p:spPr>
+        <p:txBody>
+          <a:bodyPr>
+            <a:normAutofit/>
+          </a:bodyPr>
+          <a:lstStyle/>
+          <a:p>
+            <a:pPr algn="l"/>
+            <a:r>
+              <a:rPr lang="en-US" dirty="0" smtClean="0">
+                <a:solidFill>
+                  <a:schemeClr val="bg1"/>
+                </a:solidFill>
+              </a:rPr>
+              <a:t>Future Improvements</a:t>
+            </a:r>
+            <a:endParaRPr lang="en-US" dirty="0">
+              <a:solidFill>
+                <a:schemeClr val="bg1"/>
+              </a:solidFill>
+            </a:endParaRPr>
+          </a:p>
+        </p:txBody>
+      </p:sp>
+      <p:sp>
+        <p:nvSpPr>
+          <p:cNvPr id="3" name="Subtitle 2"/>
+          <p:cNvSpPr>
+            <a:spLocks noGrp="1"/>
+          </p:cNvSpPr>
+          <p:nvPr>
+            <p:ph type="subTitle" idx="1"/>
+          </p:nvPr>
+        </p:nvSpPr>
+        <p:spPr>
+          <a:xfrm>
+            <a:off x="304800" y="1219200"/>
+            <a:ext cx="8839200" cy="5410200"/>
+          </a:xfrm>
+        </p:spPr>
+        <p:txBody>
+          <a:bodyPr>
+            <a:normAutofit fontScale="85000" lnSpcReduction="20000"/>
+          </a:bodyPr>
+          <a:lstStyle/>
+          <a:p>
+            <a:pPr marL="514350" indent="-514350" algn="l">
+              <a:buFont typeface="+mj-lt"/>
+              <a:buAutoNum type="arabicPeriod"/>
+            </a:pPr>
+            <a:r>
+              <a:rPr lang="en-US" sz="3100" dirty="0" smtClean="0">
+                <a:solidFill>
+                  <a:schemeClr val="bg1"/>
+                </a:solidFill>
+              </a:rPr>
+              <a:t>Use of </a:t>
+            </a:r>
+            <a:r>
+              <a:rPr lang="en-US" sz="3100" dirty="0" err="1">
+                <a:solidFill>
+                  <a:schemeClr val="bg1"/>
+                </a:solidFill>
+              </a:rPr>
+              <a:t>w</a:t>
+            </a:r>
+            <a:r>
+              <a:rPr lang="en-US" sz="3100" dirty="0" err="1" smtClean="0">
+                <a:solidFill>
+                  <a:schemeClr val="bg1"/>
+                </a:solidFill>
+              </a:rPr>
+              <a:t>ebsockets</a:t>
+            </a:r>
+            <a:r>
+              <a:rPr lang="en-US" sz="3100" dirty="0" smtClean="0">
+                <a:solidFill>
+                  <a:schemeClr val="bg1"/>
+                </a:solidFill>
+              </a:rPr>
+              <a:t> instead of polling</a:t>
+            </a:r>
+          </a:p>
+          <a:p>
+            <a:pPr marL="514350" indent="-514350" algn="l">
+              <a:buFont typeface="+mj-lt"/>
+              <a:buAutoNum type="arabicPeriod"/>
+            </a:pPr>
+            <a:r>
+              <a:rPr lang="en-US" sz="3100" dirty="0" smtClean="0">
+                <a:solidFill>
+                  <a:schemeClr val="bg1"/>
+                </a:solidFill>
+              </a:rPr>
+              <a:t>Restrict Public Key Exchange to face-to-face interaction only</a:t>
+            </a:r>
+            <a:endParaRPr lang="en-US" sz="3100" dirty="0">
+              <a:solidFill>
+                <a:schemeClr val="bg1"/>
+              </a:solidFill>
+            </a:endParaRPr>
+          </a:p>
+          <a:p>
+            <a:pPr marL="514350" indent="-514350" algn="l">
+              <a:buFont typeface="+mj-lt"/>
+              <a:buAutoNum type="arabicPeriod"/>
+            </a:pPr>
+            <a:r>
+              <a:rPr lang="en-US" sz="3100" dirty="0" smtClean="0">
+                <a:solidFill>
+                  <a:schemeClr val="bg1"/>
+                </a:solidFill>
+              </a:rPr>
+              <a:t>Create </a:t>
+            </a:r>
+            <a:r>
+              <a:rPr lang="en-US" sz="3100" dirty="0">
+                <a:solidFill>
+                  <a:schemeClr val="bg1"/>
+                </a:solidFill>
+              </a:rPr>
+              <a:t>more incentives for person to host their own </a:t>
+            </a:r>
+            <a:r>
+              <a:rPr lang="en-US" sz="3100" dirty="0" err="1">
+                <a:solidFill>
+                  <a:schemeClr val="bg1"/>
+                </a:solidFill>
+              </a:rPr>
+              <a:t>CipherChat</a:t>
+            </a:r>
+            <a:r>
+              <a:rPr lang="en-US" sz="3100" dirty="0">
+                <a:solidFill>
+                  <a:schemeClr val="bg1"/>
+                </a:solidFill>
+              </a:rPr>
+              <a:t> </a:t>
+            </a:r>
+            <a:r>
+              <a:rPr lang="en-US" sz="3100" dirty="0" smtClean="0">
+                <a:solidFill>
+                  <a:schemeClr val="bg1"/>
+                </a:solidFill>
+              </a:rPr>
+              <a:t>servers</a:t>
+            </a:r>
+          </a:p>
+          <a:p>
+            <a:pPr marL="514350" indent="-514350" algn="l">
+              <a:buFont typeface="+mj-lt"/>
+              <a:buAutoNum type="arabicPeriod"/>
+            </a:pPr>
+            <a:r>
+              <a:rPr lang="en-US" sz="3100" dirty="0" smtClean="0">
+                <a:solidFill>
+                  <a:schemeClr val="bg1"/>
+                </a:solidFill>
+              </a:rPr>
+              <a:t>Notifications</a:t>
+            </a:r>
+          </a:p>
+          <a:p>
+            <a:pPr marL="514350" indent="-514350" algn="l">
+              <a:buFont typeface="+mj-lt"/>
+              <a:buAutoNum type="arabicPeriod"/>
+            </a:pPr>
+            <a:r>
+              <a:rPr lang="en-US" sz="3100" dirty="0" smtClean="0">
+                <a:solidFill>
+                  <a:schemeClr val="bg1"/>
+                </a:solidFill>
+              </a:rPr>
+              <a:t>Make app multilingual</a:t>
+            </a:r>
+          </a:p>
+          <a:p>
+            <a:pPr marL="514350" indent="-514350" algn="l">
+              <a:buFont typeface="+mj-lt"/>
+              <a:buAutoNum type="arabicPeriod"/>
+            </a:pPr>
+            <a:r>
+              <a:rPr lang="en-US" sz="3100" dirty="0" smtClean="0">
+                <a:solidFill>
+                  <a:schemeClr val="bg1"/>
+                </a:solidFill>
+              </a:rPr>
+              <a:t>Allow </a:t>
+            </a:r>
+            <a:r>
+              <a:rPr lang="en-US" sz="3100" dirty="0">
+                <a:solidFill>
+                  <a:schemeClr val="bg1"/>
+                </a:solidFill>
+              </a:rPr>
+              <a:t>for the parsing of more complex data such as images and </a:t>
+            </a:r>
+            <a:r>
+              <a:rPr lang="en-US" sz="3100" dirty="0" smtClean="0">
+                <a:solidFill>
+                  <a:schemeClr val="bg1"/>
+                </a:solidFill>
+              </a:rPr>
+              <a:t>videos</a:t>
+            </a:r>
+          </a:p>
+          <a:p>
+            <a:pPr algn="l"/>
+            <a:endParaRPr lang="en-US" sz="1600" dirty="0">
+              <a:solidFill>
+                <a:schemeClr val="bg1"/>
+              </a:solidFill>
+            </a:endParaRPr>
+          </a:p>
+          <a:p>
+            <a:pPr algn="l"/>
+            <a:r>
+              <a:rPr lang="en-US" sz="3100" u="sng" dirty="0" smtClean="0">
+                <a:solidFill>
+                  <a:schemeClr val="bg1"/>
+                </a:solidFill>
+              </a:rPr>
+              <a:t>Distant Future</a:t>
+            </a:r>
+          </a:p>
+          <a:p>
+            <a:pPr marL="514350" indent="-514350" algn="l">
+              <a:buFont typeface="+mj-lt"/>
+              <a:buAutoNum type="arabicPeriod"/>
+            </a:pPr>
+            <a:r>
+              <a:rPr lang="en-US" sz="3100" dirty="0" smtClean="0">
+                <a:solidFill>
+                  <a:schemeClr val="bg1"/>
+                </a:solidFill>
+              </a:rPr>
+              <a:t>Facilitate the sending of any currency (using crypto)</a:t>
+            </a:r>
+          </a:p>
+          <a:p>
+            <a:pPr marL="514350" indent="-514350" algn="l">
+              <a:buFont typeface="+mj-lt"/>
+              <a:buAutoNum type="arabicPeriod"/>
+            </a:pPr>
+            <a:r>
+              <a:rPr lang="en-US" sz="3100" dirty="0" err="1" smtClean="0">
+                <a:solidFill>
+                  <a:schemeClr val="bg1"/>
+                </a:solidFill>
+              </a:rPr>
+              <a:t>Blockchain</a:t>
+            </a:r>
+            <a:endParaRPr lang="en-US" sz="3100" dirty="0" smtClean="0">
+              <a:solidFill>
+                <a:schemeClr val="bg1"/>
+              </a:solidFill>
+            </a:endParaRPr>
+          </a:p>
+          <a:p>
+            <a:pPr marL="514350" indent="-514350" algn="l">
+              <a:buFont typeface="+mj-lt"/>
+              <a:buAutoNum type="arabicPeriod"/>
+            </a:pPr>
+            <a:r>
+              <a:rPr lang="en-US" sz="3100" dirty="0" smtClean="0">
+                <a:solidFill>
+                  <a:schemeClr val="bg1"/>
+                </a:solidFill>
+              </a:rPr>
+              <a:t>Free Decentralized Applets (Cab Hailing, Package Delivery etc.)</a:t>
+            </a:r>
+          </a:p>
+          <a:p>
+            <a:pPr marL="514350" indent="-514350" algn="l">
+              <a:buFont typeface="+mj-lt"/>
+              <a:buAutoNum type="arabicPeriod"/>
+            </a:pPr>
+            <a:endParaRPr lang="en-US" sz="3100" dirty="0" smtClean="0">
+              <a:solidFill>
+                <a:schemeClr val="bg1"/>
+              </a:solidFill>
+            </a:endParaRPr>
+          </a:p>
+          <a:p>
+            <a:pPr marL="514350" indent="-514350" algn="l">
+              <a:buFont typeface="+mj-lt"/>
+              <a:buAutoNum type="arabicPeriod"/>
+            </a:pPr>
+            <a:endParaRPr lang="en-US" sz="3100" dirty="0" smtClean="0">
+              <a:solidFill>
+                <a:schemeClr val="bg1"/>
+              </a:solidFill>
+            </a:endParaRPr>
+          </a:p>
+        </p:txBody>
+      </p:sp>
+    </p:spTree>
+    <p:extLst>
+      <p:ext uri="{BB962C8B-B14F-4D97-AF65-F5344CB8AC3E}">
+        <p14:creationId xmlns:p14="http://schemas.microsoft.com/office/powerpoint/2010/main" val="1032352236"/>
+      </p:ext>
+    </p:extLst>
+  </p:cSld>
+  <p:clrMapOvr>
+    <a:masterClrMapping/>
+  </p:clrMapOvr>
+  <p:timing>
+    <p:tnLst>
+      <p:par>
+        <p:cTn id="1" dur="indefinite" restart="never" nodeType="tmRoot"/>
+      </p:par>
+    </p:tnLst>
+  </p:timing>
+</p:sld>
+</file>
+
+<file path=ppt/slides/slide15.xml><?xml version="1.0" encoding="utf-8"?>
+<p:sld xmlns:a="http://schemas.openxmlformats.org/drawingml/2006/main" xmlns:r="http://schemas.openxmlformats.org/officeDocument/2006/relationships" xmlns:p="http://schemas.openxmlformats.org/presentationml/2006/main">
+  <p:cSld>
+    <p:spTree>
+      <p:nvGrpSpPr>
+        <p:cNvPr id="1" name=""/>
+        <p:cNvGrpSpPr/>
+        <p:nvPr/>
+      </p:nvGrpSpPr>
+      <p:grpSpPr>
+        <a:xfrm>
+          <a:off x="0" y="0"/>
+          <a:ext cx="0" cy="0"/>
+          <a:chOff x="0" y="0"/>
+          <a:chExt cx="0" cy="0"/>
+        </a:xfrm>
+      </p:grpSpPr>
+      <p:sp>
+        <p:nvSpPr>
+          <p:cNvPr id="2" name="Title 1"/>
+          <p:cNvSpPr>
+            <a:spLocks noGrp="1"/>
+          </p:cNvSpPr>
+          <p:nvPr>
+            <p:ph type="ctrTitle"/>
+          </p:nvPr>
+        </p:nvSpPr>
+        <p:spPr>
+          <a:xfrm>
             <a:off x="0" y="2514600"/>
             <a:ext cx="9144000" cy="1447800"/>
           </a:xfrm>
@@ -4401,7 +4568,30 @@
                   <a:schemeClr val="bg1"/>
                 </a:solidFill>
               </a:rPr>
-              <a:t>ttention!</a:t>
+              <a:t>ttention</a:t>
+            </a:r>
+            <a:r>
+              <a:rPr lang="en-US" dirty="0" smtClean="0">
+                <a:solidFill>
+                  <a:schemeClr val="bg1"/>
+                </a:solidFill>
+              </a:rPr>
+              <a:t>!</a:t>
+            </a:r>
+            <a:br>
+              <a:rPr lang="en-US" dirty="0" smtClean="0">
+                <a:solidFill>
+                  <a:schemeClr val="bg1"/>
+                </a:solidFill>
+              </a:rPr>
+            </a:br>
+            <a:r>
+              <a:rPr lang="en-US" sz="3200" dirty="0" smtClean="0">
+                <a:solidFill>
+                  <a:schemeClr val="bg1"/>
+                </a:solidFill>
+              </a:rPr>
+              <a:t>Any Question?</a:t>
             </a:r>
             <a:endParaRPr lang="en-US" dirty="0">
               <a:solidFill>
@@ -4608,7 +4798,7 @@
                   <a:schemeClr val="bg1"/>
                 </a:solidFill>
               </a:rPr>
-              <a:t>Tools Used</a:t>
+              <a:t>User Interface</a:t>
             </a:r>
             <a:endParaRPr lang="en-US" dirty="0">
               <a:solidFill>
@@ -4641,137 +4831,6 @@
           <a:lstStyle/>
           <a:p>
             <a:pPr algn="l"/>
-            <a:r>
-              <a:rPr lang="en-US" dirty="0" smtClean="0">
-                <a:solidFill>
-                  <a:schemeClr val="bg1"/>
-                </a:solidFill>
-              </a:rPr>
-              <a:t>The following languages contributed to completion of this project</a:t>
-            </a:r>
-          </a:p>
-          <a:p>
-            <a:pPr algn="l"/>
-            <a:endParaRPr lang="en-US" sz="1800" dirty="0" smtClean="0">
-              <a:solidFill>
-                <a:schemeClr val="bg1"/>
-              </a:solidFill>
-            </a:endParaRPr>
-          </a:p>
-          <a:p>
-            <a:pPr marL="514350" indent="-514350" algn="l">
-              <a:buFont typeface="+mj-lt"/>
-              <a:buAutoNum type="arabicPeriod"/>
-            </a:pPr>
-            <a:r>
-              <a:rPr lang="en-US" dirty="0" smtClean="0">
-                <a:solidFill>
-                  <a:schemeClr val="bg1"/>
-                </a:solidFill>
-              </a:rPr>
-              <a:t>JavaScript </a:t>
-            </a:r>
-            <a:r>
-              <a:rPr lang="en-US" sz="2000" dirty="0" smtClean="0">
-                <a:solidFill>
-                  <a:schemeClr val="bg1"/>
-                </a:solidFill>
-              </a:rPr>
-              <a:t>(Server &amp; Client)</a:t>
-            </a:r>
-          </a:p>
-          <a:p>
-            <a:pPr marL="514350" indent="-514350" algn="l">
-              <a:buFont typeface="+mj-lt"/>
-              <a:buAutoNum type="arabicPeriod"/>
-            </a:pPr>
-            <a:r>
-              <a:rPr lang="en-US" dirty="0" smtClean="0">
-                <a:solidFill>
-                  <a:schemeClr val="bg1"/>
-                </a:solidFill>
-              </a:rPr>
-              <a:t>Dart </a:t>
-            </a:r>
-            <a:r>
-              <a:rPr lang="en-US" sz="2000" dirty="0" smtClean="0">
-                <a:solidFill>
-                  <a:schemeClr val="bg1"/>
-                </a:solidFill>
-              </a:rPr>
-              <a:t>(Client)</a:t>
-            </a:r>
-          </a:p>
-          <a:p>
-            <a:pPr marL="514350" indent="-514350" algn="l">
-              <a:buFont typeface="+mj-lt"/>
-              <a:buAutoNum type="arabicPeriod"/>
-            </a:pPr>
-            <a:r>
-              <a:rPr lang="en-US" dirty="0" smtClean="0">
-                <a:solidFill>
-                  <a:schemeClr val="bg1"/>
-                </a:solidFill>
-              </a:rPr>
-              <a:t>SQL </a:t>
-            </a:r>
-            <a:r>
-              <a:rPr lang="en-US" sz="2000" dirty="0">
-                <a:solidFill>
-                  <a:schemeClr val="bg1"/>
-                </a:solidFill>
-              </a:rPr>
-              <a:t>(Server &amp; Client</a:t>
-            </a:r>
-            <a:r>
-              <a:rPr lang="en-US" sz="2000" dirty="0" smtClean="0">
-                <a:solidFill>
-                  <a:schemeClr val="bg1"/>
-                </a:solidFill>
-              </a:rPr>
-              <a:t>)</a:t>
-            </a:r>
-          </a:p>
-          <a:p>
-            <a:pPr marL="514350" indent="-514350" algn="l">
-              <a:buFont typeface="+mj-lt"/>
-              <a:buAutoNum type="arabicPeriod"/>
-            </a:pPr>
-            <a:r>
-              <a:rPr lang="en-US" dirty="0" smtClean="0">
-                <a:solidFill>
-                  <a:schemeClr val="bg1"/>
-                </a:solidFill>
-              </a:rPr>
-              <a:t>Bash </a:t>
-            </a:r>
-            <a:r>
-              <a:rPr lang="en-US" dirty="0">
-                <a:solidFill>
-                  <a:schemeClr val="bg1"/>
-                </a:solidFill>
-              </a:rPr>
-              <a:t>Scripting Language </a:t>
-            </a:r>
-            <a:r>
-              <a:rPr lang="en-US" sz="2000" dirty="0">
-                <a:solidFill>
-                  <a:schemeClr val="bg1"/>
-                </a:solidFill>
-              </a:rPr>
-              <a:t>(</a:t>
-            </a:r>
-            <a:r>
-              <a:rPr lang="en-US" sz="2000" dirty="0" smtClean="0">
-                <a:solidFill>
-                  <a:schemeClr val="bg1"/>
-                </a:solidFill>
-              </a:rPr>
-              <a:t>Server)</a:t>
-            </a:r>
-          </a:p>
-          <a:p>
-            <a:pPr algn="l"/>
             <a:endParaRPr lang="en-US" dirty="0">
               <a:solidFill>
                 <a:schemeClr val="bg1"/>
@@ -4780,6 +4839,66 @@
           </a:p>
         </p:txBody>
       </p:sp>
+      <p:pic>
+        <p:nvPicPr>
+          <p:cNvPr id="4" name="Picture 3"/>
+          <p:cNvPicPr>
+            <a:picLocks noChangeAspect="1"/>
+          </p:cNvPicPr>
+          <p:nvPr/>
+        </p:nvPicPr>
+        <p:blipFill>
+          <a:blip r:embed="rId2" cstate="print">
+            <a:extLst>
+              <a:ext uri="{28A0092B-C50C-407E-A947-70E740481C1C}">
+                <a14:useLocalDpi xmlns:a14="http://schemas.microsoft.com/office/drawing/2010/main" val="0"/>
+              </a:ext>
+            </a:extLst>
+          </a:blip>
+          <a:stretch>
+            <a:fillRect/>
+          </a:stretch>
+        </p:blipFill>
+        <p:spPr>
+          <a:xfrm>
+            <a:off x="1147549" y="1371600"/>
+            <a:ext cx="2552700" cy="5105400"/>
+          </a:xfrm>
+          <a:prstGeom prst="rect">
+            <a:avLst/>
+          </a:prstGeom>
+        </p:spPr>
+      </p:pic>
+      <p:pic>
+        <p:nvPicPr>
+          <p:cNvPr id="5" name="Picture 4"/>
+          <p:cNvPicPr>
+            <a:picLocks noChangeAspect="1"/>
+          </p:cNvPicPr>
+          <p:nvPr/>
+        </p:nvPicPr>
+        <p:blipFill>
+          <a:blip r:embed="rId3" cstate="print">
+            <a:extLst>
+              <a:ext uri="{28A0092B-C50C-407E-A947-70E740481C1C}">
+                <a14:useLocalDpi xmlns:a14="http://schemas.microsoft.com/office/drawing/2010/main" val="0"/>
+              </a:ext>
+            </a:extLst>
+          </a:blip>
+          <a:stretch>
+            <a:fillRect/>
+          </a:stretch>
+        </p:blipFill>
+        <p:spPr>
+          <a:xfrm>
+            <a:off x="5257800" y="1360227"/>
+            <a:ext cx="2558387" cy="5116773"/>
+          </a:xfrm>
+          <a:prstGeom prst="rect">
+            <a:avLst/>
+          </a:prstGeom>
+        </p:spPr>
+      </p:pic>
     </p:spTree>
     <p:extLst>
       <p:ext uri="{BB962C8B-B14F-4D97-AF65-F5344CB8AC3E}">
@@ -4846,6 +4965,244 @@
                   <a:schemeClr val="bg1"/>
                 </a:solidFill>
               </a:rPr>
+              <a:t>Tools Used</a:t>
+            </a:r>
+            <a:endParaRPr lang="en-US" dirty="0">
+              <a:solidFill>
+                <a:schemeClr val="bg1"/>
+              </a:solidFill>
+            </a:endParaRPr>
+          </a:p>
+        </p:txBody>
+      </p:sp>
+      <p:sp>
+        <p:nvSpPr>
+          <p:cNvPr id="3" name="Subtitle 2"/>
+          <p:cNvSpPr>
+            <a:spLocks noGrp="1"/>
+          </p:cNvSpPr>
+          <p:nvPr>
+            <p:ph type="subTitle" idx="1"/>
+          </p:nvPr>
+        </p:nvSpPr>
+        <p:spPr>
+          <a:xfrm>
+            <a:off x="457200" y="1371600"/>
+            <a:ext cx="8229600" cy="4419600"/>
+          </a:xfrm>
+        </p:spPr>
+        <p:txBody>
+          <a:bodyPr>
+            <a:normAutofit/>
+          </a:bodyPr>
+          <a:lstStyle/>
+          <a:p>
+            <a:pPr algn="l"/>
+            <a:r>
+              <a:rPr lang="en-US" dirty="0" smtClean="0">
+                <a:solidFill>
+                  <a:schemeClr val="bg1"/>
+                </a:solidFill>
+              </a:rPr>
+              <a:t>The following languages contributed to completion of this project</a:t>
+            </a:r>
+          </a:p>
+          <a:p>
+            <a:pPr algn="l"/>
+            <a:endParaRPr lang="en-US" sz="1800" dirty="0" smtClean="0">
+              <a:solidFill>
+                <a:schemeClr val="bg1"/>
+              </a:solidFill>
+            </a:endParaRPr>
+          </a:p>
+          <a:p>
+            <a:pPr marL="514350" indent="-514350" algn="l">
+              <a:buFont typeface="+mj-lt"/>
+              <a:buAutoNum type="arabicPeriod"/>
+            </a:pPr>
+            <a:r>
+              <a:rPr lang="en-US" dirty="0" smtClean="0">
+                <a:solidFill>
+                  <a:schemeClr val="bg1"/>
+                </a:solidFill>
+              </a:rPr>
+              <a:t>JavaScript </a:t>
+            </a:r>
+            <a:r>
+              <a:rPr lang="en-US" sz="2000" dirty="0" smtClean="0">
+                <a:solidFill>
+                  <a:schemeClr val="bg1"/>
+                </a:solidFill>
+              </a:rPr>
+              <a:t>(Server &amp; Client)</a:t>
+            </a:r>
+          </a:p>
+          <a:p>
+            <a:pPr marL="514350" indent="-514350" algn="l">
+              <a:buFont typeface="+mj-lt"/>
+              <a:buAutoNum type="arabicPeriod"/>
+            </a:pPr>
+            <a:r>
+              <a:rPr lang="en-US" dirty="0" smtClean="0">
+                <a:solidFill>
+                  <a:schemeClr val="bg1"/>
+                </a:solidFill>
+              </a:rPr>
+              <a:t>Dart </a:t>
+            </a:r>
+            <a:r>
+              <a:rPr lang="en-US" sz="2000" dirty="0" smtClean="0">
+                <a:solidFill>
+                  <a:schemeClr val="bg1"/>
+                </a:solidFill>
+              </a:rPr>
+              <a:t>(Client)</a:t>
+            </a:r>
+          </a:p>
+          <a:p>
+            <a:pPr marL="514350" indent="-514350" algn="l">
+              <a:buFont typeface="+mj-lt"/>
+              <a:buAutoNum type="arabicPeriod"/>
+            </a:pPr>
+            <a:r>
+              <a:rPr lang="en-US" dirty="0" smtClean="0">
+                <a:solidFill>
+                  <a:schemeClr val="bg1"/>
+                </a:solidFill>
+              </a:rPr>
+              <a:t>SQL </a:t>
+            </a:r>
+            <a:r>
+              <a:rPr lang="en-US" sz="2000" dirty="0">
+                <a:solidFill>
+                  <a:schemeClr val="bg1"/>
+                </a:solidFill>
+              </a:rPr>
+              <a:t>(Server &amp; Client</a:t>
+            </a:r>
+            <a:r>
+              <a:rPr lang="en-US" sz="2000" dirty="0" smtClean="0">
+                <a:solidFill>
+                  <a:schemeClr val="bg1"/>
+                </a:solidFill>
+              </a:rPr>
+              <a:t>)</a:t>
+            </a:r>
+          </a:p>
+          <a:p>
+            <a:pPr marL="514350" indent="-514350" algn="l">
+              <a:buFont typeface="+mj-lt"/>
+              <a:buAutoNum type="arabicPeriod"/>
+            </a:pPr>
+            <a:r>
+              <a:rPr lang="en-US" dirty="0" smtClean="0">
+                <a:solidFill>
+                  <a:schemeClr val="bg1"/>
+                </a:solidFill>
+              </a:rPr>
+              <a:t>Bash </a:t>
+            </a:r>
+            <a:r>
+              <a:rPr lang="en-US" dirty="0">
+                <a:solidFill>
+                  <a:schemeClr val="bg1"/>
+                </a:solidFill>
+              </a:rPr>
+              <a:t>Scripting Language </a:t>
+            </a:r>
+            <a:r>
+              <a:rPr lang="en-US" sz="2000" dirty="0">
+                <a:solidFill>
+                  <a:schemeClr val="bg1"/>
+                </a:solidFill>
+              </a:rPr>
+              <a:t>(</a:t>
+            </a:r>
+            <a:r>
+              <a:rPr lang="en-US" sz="2000" dirty="0" smtClean="0">
+                <a:solidFill>
+                  <a:schemeClr val="bg1"/>
+                </a:solidFill>
+              </a:rPr>
+              <a:t>Server)</a:t>
+            </a:r>
+          </a:p>
+          <a:p>
+            <a:pPr algn="l"/>
+            <a:endParaRPr lang="en-US" dirty="0">
+              <a:solidFill>
+                <a:schemeClr val="bg1"/>
+              </a:solidFill>
+            </a:endParaRPr>
+          </a:p>
+        </p:txBody>
+      </p:sp>
+    </p:spTree>
+    <p:extLst>
+      <p:ext uri="{BB962C8B-B14F-4D97-AF65-F5344CB8AC3E}">
+        <p14:creationId xmlns:p14="http://schemas.microsoft.com/office/powerpoint/2010/main" val="2418237784"/>
+      </p:ext>
+    </p:extLst>
+  </p:cSld>
+  <p:clrMapOvr>
+    <a:masterClrMapping/>
+  </p:clrMapOvr>
+  <p:timing>
+    <p:tnLst>
+      <p:par>
+        <p:cTn id="1" dur="indefinite" restart="never" nodeType="tmRoot"/>
+      </p:par>
+    </p:tnLst>
+  </p:timing>
+</p:sld>
+</file>
+
+<file path=ppt/slides/slide5.xml><?xml version="1.0" encoding="utf-8"?>
+<p:sld xmlns:a="http://schemas.openxmlformats.org/drawingml/2006/main" xmlns:r="http://schemas.openxmlformats.org/officeDocument/2006/relationships" xmlns:p="http://schemas.openxmlformats.org/presentationml/2006/main">
+  <p:cSld>
+    <p:spTree>
+      <p:nvGrpSpPr>
+        <p:cNvPr id="1" name=""/>
+        <p:cNvGrpSpPr/>
+        <p:nvPr/>
+      </p:nvGrpSpPr>
+      <p:grpSpPr>
+        <a:xfrm>
+          <a:off x="0" y="0"/>
+          <a:ext cx="0" cy="0"/>
+          <a:chOff x="0" y="0"/>
+          <a:chExt cx="0" cy="0"/>
+        </a:xfrm>
+      </p:grpSpPr>
+      <p:sp>
+        <p:nvSpPr>
+          <p:cNvPr id="2" name="Title 1"/>
+          <p:cNvSpPr>
+            <a:spLocks noGrp="1"/>
+          </p:cNvSpPr>
+          <p:nvPr>
+            <p:ph type="ctrTitle"/>
+          </p:nvPr>
+        </p:nvSpPr>
+        <p:spPr>
+          <a:xfrm>
+            <a:off x="304800" y="152400"/>
+            <a:ext cx="8610600" cy="1447800"/>
+          </a:xfrm>
+        </p:spPr>
+        <p:txBody>
+          <a:bodyPr>
+            <a:normAutofit/>
+          </a:bodyPr>
+          <a:lstStyle/>
+          <a:p>
+            <a:pPr algn="l"/>
+            <a:r>
+              <a:rPr lang="en-US" dirty="0" smtClean="0">
+                <a:solidFill>
+                  <a:schemeClr val="bg1"/>
+                </a:solidFill>
+              </a:rPr>
               <a:t>Cryptography</a:t>
             </a:r>
             <a:endParaRPr lang="en-US" dirty="0">
@@ -5003,7 +5360,7 @@
 </p:sld>
 </file>
 
-<file path=ppt/slides/slide5.xml><?xml version="1.0" encoding="utf-8"?>
+<file path=ppt/slides/slide6.xml><?xml version="1.0" encoding="utf-8"?>
 <p:sld xmlns:a="http://schemas.openxmlformats.org/drawingml/2006/main" xmlns:r="http://schemas.openxmlformats.org/officeDocument/2006/relationships" xmlns:p="http://schemas.openxmlformats.org/presentationml/2006/main">
   <p:cSld>
     <p:spTree>
@@ -5276,7 +5633,7 @@
 </p:sld>
 </file>
 
-<file path=ppt/slides/slide6.xml><?xml version="1.0" encoding="utf-8"?>
+<file path=ppt/slides/slide7.xml><?xml version="1.0" encoding="utf-8"?>
 <p:sld xmlns:a="http://schemas.openxmlformats.org/drawingml/2006/main" xmlns:r="http://schemas.openxmlformats.org/officeDocument/2006/relationships" xmlns:p="http://schemas.openxmlformats.org/presentationml/2006/main">
   <p:cSld>
     <p:spTree>
@@ -5419,7 +5776,7 @@
 </p:sld>
 </file>
 
-<file path=ppt/slides/slide7.xml><?xml version="1.0" encoding="utf-8"?>
+<file path=ppt/slides/slide8.xml><?xml version="1.0" encoding="utf-8"?>
 <p:sld xmlns:a="http://schemas.openxmlformats.org/drawingml/2006/main" xmlns:r="http://schemas.openxmlformats.org/officeDocument/2006/relationships" xmlns:p="http://schemas.openxmlformats.org/presentationml/2006/main">
   <p:cSld>
     <p:spTree>
@@ -5606,258 +5963,6 @@
 </p:sld>
 </file>
 
-<file path=ppt/slides/slide8.xml><?xml version="1.0" encoding="utf-8"?>
-<p:sld xmlns:a="http://schemas.openxmlformats.org/drawingml/2006/main" xmlns:r="http://schemas.openxmlformats.org/officeDocument/2006/relationships" xmlns:p="http://schemas.openxmlformats.org/presentationml/2006/main">
-  <p:cSld>
-    <p:spTree>
-      <p:nvGrpSpPr>
-        <p:cNvPr id="1" name=""/>
-        <p:cNvGrpSpPr/>
-        <p:nvPr/>
-      </p:nvGrpSpPr>
-      <p:grpSpPr>
-        <a:xfrm>
-          <a:off x="0" y="0"/>
-          <a:ext cx="0" cy="0"/>
-          <a:chOff x="0" y="0"/>
-          <a:chExt cx="0" cy="0"/>
-        </a:xfrm>
-      </p:grpSpPr>
-      <p:sp>
-        <p:nvSpPr>
-          <p:cNvPr id="2" name="Title 1"/>
-          <p:cNvSpPr>
-            <a:spLocks noGrp="1"/>
-          </p:cNvSpPr>
-          <p:nvPr>
-            <p:ph type="ctrTitle"/>
-          </p:nvPr>
-        </p:nvSpPr>
-        <p:spPr>
-          <a:xfrm>
-            <a:off x="304800" y="152400"/>
-            <a:ext cx="8610600" cy="1447800"/>
-          </a:xfrm>
-        </p:spPr>
-        <p:txBody>
-          <a:bodyPr>
-            <a:normAutofit/>
-          </a:bodyPr>
-          <a:lstStyle/>
-          <a:p>
-            <a:pPr algn="l"/>
-            <a:r>
-              <a:rPr lang="en-US" dirty="0" smtClean="0">
-                <a:solidFill>
-                  <a:schemeClr val="bg1"/>
-                </a:solidFill>
-              </a:rPr>
-              <a:t>Method</a:t>
-            </a:r>
-            <a:endParaRPr lang="en-US" dirty="0">
-              <a:solidFill>
-                <a:schemeClr val="bg1"/>
-              </a:solidFill>
-            </a:endParaRPr>
-          </a:p>
-        </p:txBody>
-      </p:sp>
-      <p:sp>
-        <p:nvSpPr>
-          <p:cNvPr id="3" name="Subtitle 2"/>
-          <p:cNvSpPr>
-            <a:spLocks noGrp="1"/>
-          </p:cNvSpPr>
-          <p:nvPr>
-            <p:ph type="subTitle" idx="1"/>
-          </p:nvPr>
-        </p:nvSpPr>
-        <p:spPr>
-          <a:xfrm>
-            <a:off x="254758" y="1219200"/>
-            <a:ext cx="8660642" cy="5486400"/>
-          </a:xfrm>
-        </p:spPr>
-        <p:txBody>
-          <a:bodyPr>
-            <a:normAutofit fontScale="92500" lnSpcReduction="20000"/>
-          </a:bodyPr>
-          <a:lstStyle/>
-          <a:p>
-            <a:pPr marL="514350" indent="-514350" algn="l">
-              <a:buFont typeface="+mj-lt"/>
-              <a:buAutoNum type="arabicPeriod"/>
-            </a:pPr>
-            <a:r>
-              <a:rPr lang="en-US" sz="3100" dirty="0" smtClean="0">
-                <a:solidFill>
-                  <a:schemeClr val="bg1"/>
-                </a:solidFill>
-              </a:rPr>
-              <a:t>Multiple clients connect to a </a:t>
-            </a:r>
-            <a:r>
-              <a:rPr lang="en-US" sz="3100" dirty="0" err="1" smtClean="0">
-                <a:solidFill>
-                  <a:schemeClr val="bg1"/>
-                </a:solidFill>
-              </a:rPr>
-              <a:t>CipherChat</a:t>
-            </a:r>
-            <a:r>
-              <a:rPr lang="en-US" sz="3100" dirty="0" smtClean="0">
-                <a:solidFill>
-                  <a:schemeClr val="bg1"/>
-                </a:solidFill>
-              </a:rPr>
-              <a:t> server</a:t>
-            </a:r>
-          </a:p>
-          <a:p>
-            <a:pPr marL="514350" indent="-514350" algn="l">
-              <a:buFont typeface="+mj-lt"/>
-              <a:buAutoNum type="arabicPeriod"/>
-            </a:pPr>
-            <a:r>
-              <a:rPr lang="en-US" sz="3100" dirty="0" smtClean="0">
-                <a:solidFill>
-                  <a:schemeClr val="bg1"/>
-                </a:solidFill>
-              </a:rPr>
-              <a:t>Clients exchange public keys using ECDH</a:t>
-            </a:r>
-          </a:p>
-          <a:p>
-            <a:pPr marL="514350" indent="-514350" algn="l">
-              <a:buFont typeface="+mj-lt"/>
-              <a:buAutoNum type="arabicPeriod"/>
-            </a:pPr>
-            <a:r>
-              <a:rPr lang="en-US" sz="3100" dirty="0" smtClean="0">
-                <a:solidFill>
-                  <a:schemeClr val="bg1"/>
-                </a:solidFill>
-              </a:rPr>
-              <a:t>Messages are encrypted using the generated symmetric key and AES</a:t>
-            </a:r>
-          </a:p>
-          <a:p>
-            <a:pPr marL="514350" indent="-514350" algn="l">
-              <a:buFont typeface="+mj-lt"/>
-              <a:buAutoNum type="arabicPeriod"/>
-            </a:pPr>
-            <a:r>
-              <a:rPr lang="en-US" sz="3100" dirty="0" smtClean="0">
-                <a:solidFill>
-                  <a:schemeClr val="bg1"/>
-                </a:solidFill>
-              </a:rPr>
-              <a:t>Messages are signed using ECDSA Signing</a:t>
-            </a:r>
-          </a:p>
-          <a:p>
-            <a:pPr marL="514350" indent="-514350" algn="l">
-              <a:buFont typeface="+mj-lt"/>
-              <a:buAutoNum type="arabicPeriod"/>
-            </a:pPr>
-            <a:r>
-              <a:rPr lang="en-US" sz="3100" dirty="0" smtClean="0">
-                <a:solidFill>
-                  <a:schemeClr val="bg1"/>
-                </a:solidFill>
-              </a:rPr>
-              <a:t>The encrypted message is sent to the server</a:t>
-            </a:r>
-          </a:p>
-          <a:p>
-            <a:pPr marL="514350" indent="-514350" algn="l">
-              <a:buFont typeface="+mj-lt"/>
-              <a:buAutoNum type="arabicPeriod"/>
-            </a:pPr>
-            <a:r>
-              <a:rPr lang="en-US" sz="3100" dirty="0" smtClean="0">
-                <a:solidFill>
-                  <a:schemeClr val="bg1"/>
-                </a:solidFill>
-              </a:rPr>
-              <a:t>The server verifies the authenticity of the message using the signature (ECDSA Verification)</a:t>
-            </a:r>
-          </a:p>
-          <a:p>
-            <a:pPr marL="514350" indent="-514350" algn="l">
-              <a:buFont typeface="+mj-lt"/>
-              <a:buAutoNum type="arabicPeriod"/>
-            </a:pPr>
-            <a:r>
-              <a:rPr lang="en-US" sz="3100" dirty="0" smtClean="0">
-                <a:solidFill>
-                  <a:schemeClr val="bg1"/>
-                </a:solidFill>
-              </a:rPr>
-              <a:t>Server saves the authenticated message</a:t>
-            </a:r>
-          </a:p>
-          <a:p>
-            <a:pPr marL="514350" indent="-514350" algn="l">
-              <a:buFont typeface="+mj-lt"/>
-              <a:buAutoNum type="arabicPeriod"/>
-            </a:pPr>
-            <a:r>
-              <a:rPr lang="en-US" sz="3100" dirty="0" smtClean="0">
-                <a:solidFill>
-                  <a:schemeClr val="bg1"/>
-                </a:solidFill>
-              </a:rPr>
-              <a:t>The other peer(s) sends requests to the server and receive the latest messages</a:t>
-            </a:r>
-          </a:p>
-          <a:p>
-            <a:pPr marL="514350" indent="-514350" algn="l">
-              <a:buFont typeface="+mj-lt"/>
-              <a:buAutoNum type="arabicPeriod"/>
-            </a:pPr>
-            <a:r>
-              <a:rPr lang="en-US" sz="3100" dirty="0" smtClean="0">
-                <a:solidFill>
-                  <a:schemeClr val="bg1"/>
-                </a:solidFill>
-              </a:rPr>
-              <a:t>The received messages are decrypted using the symmetric key and AES</a:t>
-            </a:r>
-          </a:p>
-          <a:p>
-            <a:pPr marL="514350" indent="-514350" algn="l">
-              <a:buFont typeface="+mj-lt"/>
-              <a:buAutoNum type="arabicPeriod"/>
-            </a:pPr>
-            <a:endParaRPr lang="en-US" sz="3100" dirty="0">
-              <a:solidFill>
-                <a:schemeClr val="bg1"/>
-              </a:solidFill>
-            </a:endParaRPr>
-          </a:p>
-        </p:txBody>
-      </p:sp>
-    </p:spTree>
-    <p:extLst>
-      <p:ext uri="{BB962C8B-B14F-4D97-AF65-F5344CB8AC3E}">
-        <p14:creationId xmlns:p14="http://schemas.microsoft.com/office/powerpoint/2010/main" val="2357914262"/>
-      </p:ext>
-    </p:extLst>
-  </p:cSld>
-  <p:clrMapOvr>
-    <a:masterClrMapping/>
-  </p:clrMapOvr>
-  <p:timing>
-    <p:tnLst>
-      <p:par>
-        <p:cTn id="1" dur="indefinite" restart="never" nodeType="tmRoot"/>
-      </p:par>
-    </p:tnLst>
-  </p:timing>
-</p:sld>
-</file>
-
 <file path=ppt/slides/slide9.xml><?xml version="1.0" encoding="utf-8"?>
 <p:sld xmlns:a="http://schemas.openxmlformats.org/drawingml/2006/main" xmlns:r="http://schemas.openxmlformats.org/officeDocument/2006/relationships" xmlns:p="http://schemas.openxmlformats.org/presentationml/2006/main">
   <p:cSld>
@@ -5899,28 +6004,12 @@
           <a:p>
             <a:pPr algn="l"/>
             <a:r>
-              <a:rPr lang="en-US" dirty="0" err="1" smtClean="0">
-                <a:solidFill>
-                  <a:schemeClr val="bg1"/>
-                </a:solidFill>
-              </a:rPr>
-              <a:t>Diffie</a:t>
-            </a:r>
-            <a:r>
               <a:rPr lang="en-US" dirty="0" smtClean="0">
                 <a:solidFill>
                   <a:schemeClr val="bg1"/>
                 </a:solidFill>
               </a:rPr>
-              <a:t> Hellman </a:t>
-            </a:r>
-            <a:r>
-              <a:rPr lang="en-US" dirty="0" err="1" smtClean="0">
-                <a:solidFill>
-                  <a:schemeClr val="bg1"/>
-                </a:solidFill>
-              </a:rPr>
-              <a:t>Vulnurability</a:t>
+              <a:t>Method</a:t>
             </a:r>
             <a:endParaRPr lang="en-US" dirty="0">
               <a:solidFill>
@@ -5942,24 +6031,27 @@
         </p:nvSpPr>
         <p:spPr>
           <a:xfrm>
-            <a:off x="228600" y="1447800"/>
-            <a:ext cx="8915400" cy="4953000"/>
+            <a:off x="254758" y="1219200"/>
+            <a:ext cx="8660642" cy="5486400"/>
           </a:xfrm>
         </p:spPr>
         <p:txBody>
           <a:bodyPr>
-            <a:normAutofit lnSpcReduction="10000"/>
+            <a:normAutofit fontScale="92500" lnSpcReduction="20000"/>
           </a:bodyPr>
           <a:lstStyle/>
           <a:p>
-            <a:pPr algn="l"/>
+            <a:pPr marL="514350" indent="-514350" algn="l">
+              <a:buFont typeface="+mj-lt"/>
+              <a:buAutoNum type="arabicPeriod"/>
+            </a:pPr>
             <a:r>
               <a:rPr lang="en-US" sz="3100" dirty="0" smtClean="0">
                 <a:solidFill>
                   <a:schemeClr val="bg1"/>
                 </a:solidFill>
               </a:rPr>
-              <a:t>Although </a:t>
+              <a:t>Multiple clients connect to a </a:t>
             </a:r>
             <a:r>
               <a:rPr lang="en-US" sz="3100" dirty="0" err="1" smtClean="0">
@@ -5967,7 +6059,7 @@
                   <a:schemeClr val="bg1"/>
                 </a:solidFill>
               </a:rPr>
-              <a:t>Diffie</a:t>
+              <a:t>CipherChat</a:t>
             </a:r>
             <a:r>
               <a:rPr lang="en-US" sz="3100" dirty="0" smtClean="0">
@@ -5975,79 +6067,138 @@
                   <a:schemeClr val="bg1"/>
                 </a:solidFill>
               </a:rPr>
-              <a:t> Hellman can defend against passive attackers it is vulnerable to </a:t>
-            </a:r>
-            <a:r>
-              <a:rPr lang="en-US" sz="3100" u="sng" dirty="0" smtClean="0">
-                <a:solidFill>
-                  <a:schemeClr val="bg1"/>
-                </a:solidFill>
-              </a:rPr>
-              <a:t>Man in the Middle Attack</a:t>
-            </a:r>
+              <a:t> server</a:t>
+            </a:r>
+          </a:p>
+          <a:p>
+            <a:pPr marL="514350" indent="-514350" algn="l">
+              <a:buFont typeface="+mj-lt"/>
+              <a:buAutoNum type="arabicPeriod"/>
+            </a:pPr>
             <a:r>
               <a:rPr lang="en-US" sz="3100" dirty="0" smtClean="0">
                 <a:solidFill>
                   <a:schemeClr val="bg1"/>
                 </a:solidFill>
               </a:rPr>
-              <a:t>. In this case the server may function as two or more separate peers, decrypting and re-encrypting message before sending them to the intended recipient.</a:t>
-            </a:r>
-          </a:p>
-          <a:p>
-            <a:pPr algn="l"/>
-            <a:r>
-              <a:rPr lang="en-US" sz="3100" u="sng" dirty="0" smtClean="0">
-                <a:solidFill>
-                  <a:schemeClr val="bg1"/>
-                </a:solidFill>
-              </a:rPr>
-              <a:t>Current Solution</a:t>
-            </a:r>
-            <a:endParaRPr lang="en-US" sz="3100" dirty="0" smtClean="0">
+              <a:t>Clients exchange public keys using ECDH</a:t>
+            </a:r>
+          </a:p>
+          <a:p>
+            <a:pPr marL="514350" indent="-514350" algn="l">
+              <a:buFont typeface="+mj-lt"/>
+              <a:buAutoNum type="arabicPeriod"/>
+            </a:pPr>
+            <a:r>
+              <a:rPr lang="en-US" sz="3100" dirty="0" smtClean="0">
+                <a:solidFill>
+                  <a:schemeClr val="bg1"/>
+                </a:solidFill>
+              </a:rPr>
+              <a:t>Messages are encrypted using the generated symmetric key and AES</a:t>
+            </a:r>
+          </a:p>
+          <a:p>
+            <a:pPr marL="514350" indent="-514350" algn="l">
+              <a:buFont typeface="+mj-lt"/>
+              <a:buAutoNum type="arabicPeriod"/>
+            </a:pPr>
+            <a:r>
+              <a:rPr lang="en-US" sz="3100" dirty="0" smtClean="0">
+                <a:solidFill>
+                  <a:schemeClr val="bg1"/>
+                </a:solidFill>
+              </a:rPr>
+              <a:t>Messages are signed using ECDSA Signing</a:t>
+            </a:r>
+          </a:p>
+          <a:p>
+            <a:pPr marL="514350" indent="-514350" algn="l">
+              <a:buFont typeface="+mj-lt"/>
+              <a:buAutoNum type="arabicPeriod"/>
+            </a:pPr>
+            <a:r>
+              <a:rPr lang="en-US" sz="3100" dirty="0" smtClean="0">
+                <a:solidFill>
+                  <a:schemeClr val="bg1"/>
+                </a:solidFill>
+              </a:rPr>
+              <a:t>The encrypted message is sent to the server</a:t>
+            </a:r>
+          </a:p>
+          <a:p>
+            <a:pPr marL="514350" indent="-514350" algn="l">
+              <a:buFont typeface="+mj-lt"/>
+              <a:buAutoNum type="arabicPeriod"/>
+            </a:pPr>
+            <a:r>
+              <a:rPr lang="en-US" sz="3100" dirty="0" smtClean="0">
+                <a:solidFill>
+                  <a:schemeClr val="bg1"/>
+                </a:solidFill>
+              </a:rPr>
+              <a:t>The server verifies the authenticity of the message using the signature (ECDSA Verification)</a:t>
+            </a:r>
+          </a:p>
+          <a:p>
+            <a:pPr marL="514350" indent="-514350" algn="l">
+              <a:buFont typeface="+mj-lt"/>
+              <a:buAutoNum type="arabicPeriod"/>
+            </a:pPr>
+            <a:r>
+              <a:rPr lang="en-US" sz="3100" dirty="0" smtClean="0">
+                <a:solidFill>
+                  <a:schemeClr val="bg1"/>
+                </a:solidFill>
+              </a:rPr>
+              <a:t>Server saves the authenticated message</a:t>
+            </a:r>
+          </a:p>
+          <a:p>
+            <a:pPr marL="514350" indent="-514350" algn="l">
+              <a:buFont typeface="+mj-lt"/>
+              <a:buAutoNum type="arabicPeriod"/>
+            </a:pPr>
+            <a:r>
+              <a:rPr lang="en-US" sz="3100" dirty="0" smtClean="0">
+                <a:solidFill>
+                  <a:schemeClr val="bg1"/>
+                </a:solidFill>
+              </a:rPr>
+              <a:t>The other peer(s) sends requests to the server and receive the latest messages</a:t>
+            </a:r>
+          </a:p>
+          <a:p>
+            <a:pPr marL="514350" indent="-514350" algn="l">
+              <a:buFont typeface="+mj-lt"/>
+              <a:buAutoNum type="arabicPeriod"/>
+            </a:pPr>
+            <a:r>
+              <a:rPr lang="en-US" sz="3100" dirty="0" smtClean="0">
+                <a:solidFill>
+                  <a:schemeClr val="bg1"/>
+                </a:solidFill>
+              </a:rPr>
+              <a:t>The received messages are decrypted using the symmetric key and AES</a:t>
+            </a:r>
+          </a:p>
+          <a:p>
+            <a:pPr marL="514350" indent="-514350" algn="l">
+              <a:buFont typeface="+mj-lt"/>
+              <a:buAutoNum type="arabicPeriod"/>
+            </a:pPr>
+            <a:endParaRPr lang="en-US" sz="3100" dirty="0">
               <a:solidFill>
                 <a:schemeClr val="bg1"/>
               </a:solidFill>
             </a:endParaRPr>
           </a:p>
-          <a:p>
-            <a:pPr marL="514350" indent="-514350" algn="l">
-              <a:buAutoNum type="arabicPeriod"/>
-            </a:pPr>
-            <a:r>
-              <a:rPr lang="en-US" sz="3100" dirty="0" smtClean="0">
-                <a:solidFill>
-                  <a:schemeClr val="bg1"/>
-                </a:solidFill>
-              </a:rPr>
-              <a:t>Host and use your own server</a:t>
-            </a:r>
-          </a:p>
-          <a:p>
-            <a:pPr algn="l"/>
-            <a:endParaRPr lang="en-US" sz="3100" dirty="0" smtClean="0">
-              <a:solidFill>
-                <a:schemeClr val="bg1"/>
-              </a:solidFill>
-            </a:endParaRPr>
-          </a:p>
-          <a:p>
-            <a:pPr algn="l"/>
-            <a:r>
-              <a:rPr lang="en-US" sz="3100" dirty="0" smtClean="0">
-                <a:solidFill>
-                  <a:schemeClr val="bg1"/>
-                </a:solidFill>
-              </a:rPr>
-              <a:t>This vulnerability will addressed later in this presentation</a:t>
-            </a:r>
-          </a:p>
         </p:txBody>
       </p:sp>
     </p:spTree>
     <p:extLst>
       <p:ext uri="{BB962C8B-B14F-4D97-AF65-F5344CB8AC3E}">
-        <p14:creationId xmlns:p14="http://schemas.microsoft.com/office/powerpoint/2010/main" val="3161049883"/>
+        <p14:creationId xmlns:p14="http://schemas.microsoft.com/office/powerpoint/2010/main" val="2357914262"/>
       </p:ext>
     </p:extLst>
   </p:cSld>

</xml_diff>

<commit_message>
Included TypeScript into CipherChat Server
</commit_message>
<xml_diff>
--- a/SWEN3004/CipherChat Presentation.pptx
+++ b/SWEN3004/CipherChat Presentation.pptx
@@ -302,7 +302,7 @@
           <a:p>
             <a:fld id="{72E4B8C5-FDE9-40E7-A1FE-02759727A400}" type="datetimeFigureOut">
               <a:rPr lang="en-US" smtClean="0"/>
-              <a:t>5/13/2019</a:t>
+              <a:t>5/16/2019</a:t>
             </a:fld>
             <a:endParaRPr lang="en-US"/>
           </a:p>
@@ -472,7 +472,7 @@
           <a:p>
             <a:fld id="{72E4B8C5-FDE9-40E7-A1FE-02759727A400}" type="datetimeFigureOut">
               <a:rPr lang="en-US" smtClean="0"/>
-              <a:t>5/13/2019</a:t>
+              <a:t>5/16/2019</a:t>
             </a:fld>
             <a:endParaRPr lang="en-US"/>
           </a:p>
@@ -652,7 +652,7 @@
           <a:p>
             <a:fld id="{72E4B8C5-FDE9-40E7-A1FE-02759727A400}" type="datetimeFigureOut">
               <a:rPr lang="en-US" smtClean="0"/>
-              <a:t>5/13/2019</a:t>
+              <a:t>5/16/2019</a:t>
             </a:fld>
             <a:endParaRPr lang="en-US"/>
           </a:p>
@@ -822,7 +822,7 @@
           <a:p>
             <a:fld id="{72E4B8C5-FDE9-40E7-A1FE-02759727A400}" type="datetimeFigureOut">
               <a:rPr lang="en-US" smtClean="0"/>
-              <a:t>5/13/2019</a:t>
+              <a:t>5/16/2019</a:t>
             </a:fld>
             <a:endParaRPr lang="en-US"/>
           </a:p>
@@ -1068,7 +1068,7 @@
           <a:p>
             <a:fld id="{72E4B8C5-FDE9-40E7-A1FE-02759727A400}" type="datetimeFigureOut">
               <a:rPr lang="en-US" smtClean="0"/>
-              <a:t>5/13/2019</a:t>
+              <a:t>5/16/2019</a:t>
             </a:fld>
             <a:endParaRPr lang="en-US"/>
           </a:p>
@@ -1356,7 +1356,7 @@
           <a:p>
             <a:fld id="{72E4B8C5-FDE9-40E7-A1FE-02759727A400}" type="datetimeFigureOut">
               <a:rPr lang="en-US" smtClean="0"/>
-              <a:t>5/13/2019</a:t>
+              <a:t>5/16/2019</a:t>
             </a:fld>
             <a:endParaRPr lang="en-US"/>
           </a:p>
@@ -1778,7 +1778,7 @@
           <a:p>
             <a:fld id="{72E4B8C5-FDE9-40E7-A1FE-02759727A400}" type="datetimeFigureOut">
               <a:rPr lang="en-US" smtClean="0"/>
-              <a:t>5/13/2019</a:t>
+              <a:t>5/16/2019</a:t>
             </a:fld>
             <a:endParaRPr lang="en-US"/>
           </a:p>
@@ -1896,7 +1896,7 @@
           <a:p>
             <a:fld id="{72E4B8C5-FDE9-40E7-A1FE-02759727A400}" type="datetimeFigureOut">
               <a:rPr lang="en-US" smtClean="0"/>
-              <a:t>5/13/2019</a:t>
+              <a:t>5/16/2019</a:t>
             </a:fld>
             <a:endParaRPr lang="en-US"/>
           </a:p>
@@ -1991,7 +1991,7 @@
           <a:p>
             <a:fld id="{72E4B8C5-FDE9-40E7-A1FE-02759727A400}" type="datetimeFigureOut">
               <a:rPr lang="en-US" smtClean="0"/>
-              <a:t>5/13/2019</a:t>
+              <a:t>5/16/2019</a:t>
             </a:fld>
             <a:endParaRPr lang="en-US"/>
           </a:p>
@@ -2268,7 +2268,7 @@
           <a:p>
             <a:fld id="{72E4B8C5-FDE9-40E7-A1FE-02759727A400}" type="datetimeFigureOut">
               <a:rPr lang="en-US" smtClean="0"/>
-              <a:t>5/13/2019</a:t>
+              <a:t>5/16/2019</a:t>
             </a:fld>
             <a:endParaRPr lang="en-US"/>
           </a:p>
@@ -2521,7 +2521,7 @@
           <a:p>
             <a:fld id="{72E4B8C5-FDE9-40E7-A1FE-02759727A400}" type="datetimeFigureOut">
               <a:rPr lang="en-US" smtClean="0"/>
-              <a:t>5/13/2019</a:t>
+              <a:t>5/16/2019</a:t>
             </a:fld>
             <a:endParaRPr lang="en-US"/>
           </a:p>
@@ -2744,7 +2744,7 @@
           <a:p>
             <a:fld id="{72E4B8C5-FDE9-40E7-A1FE-02759727A400}" type="datetimeFigureOut">
               <a:rPr lang="en-US" smtClean="0"/>
-              <a:t>5/13/2019</a:t>
+              <a:t>5/16/2019</a:t>
             </a:fld>
             <a:endParaRPr lang="en-US"/>
           </a:p>
@@ -3531,15 +3531,7 @@
                   <a:schemeClr val="bg1"/>
                 </a:solidFill>
               </a:rPr>
-              <a:t>re-encrypting </a:t>
-            </a:r>
-            <a:r>
-              <a:rPr lang="en-US" sz="3100" smtClean="0">
-                <a:solidFill>
-                  <a:schemeClr val="bg1"/>
-                </a:solidFill>
-              </a:rPr>
-              <a:t>messages </a:t>
+              <a:t>re-encrypting messages </a:t>
             </a:r>
             <a:r>
               <a:rPr lang="en-US" sz="3100" dirty="0" smtClean="0">
@@ -4973,6 +4965,49 @@
               <a:buAutoNum type="arabicPeriod"/>
             </a:pPr>
             <a:r>
+              <a:rPr lang="en-US" dirty="0" err="1">
+                <a:solidFill>
+                  <a:schemeClr val="bg1"/>
+                </a:solidFill>
+              </a:rPr>
+              <a:t>TypeScript</a:t>
+            </a:r>
+            <a:r>
+              <a:rPr lang="en-US" dirty="0">
+                <a:solidFill>
+                  <a:schemeClr val="bg1"/>
+                </a:solidFill>
+              </a:rPr>
+              <a:t> </a:t>
+            </a:r>
+            <a:r>
+              <a:rPr lang="en-US" sz="2000" dirty="0">
+                <a:solidFill>
+                  <a:schemeClr val="bg1"/>
+                </a:solidFill>
+              </a:rPr>
+              <a:t>(Server</a:t>
+            </a:r>
+            <a:r>
+              <a:rPr lang="en-US" sz="2000" dirty="0" smtClean="0">
+                <a:solidFill>
+                  <a:schemeClr val="bg1"/>
+                </a:solidFill>
+              </a:rPr>
+              <a:t>)</a:t>
+            </a:r>
+            <a:endParaRPr lang="en-US" sz="2000" dirty="0" smtClean="0">
+              <a:solidFill>
+                <a:schemeClr val="bg1"/>
+              </a:solidFill>
+            </a:endParaRPr>
+          </a:p>
+          <a:p>
+            <a:pPr marL="514350" indent="-514350" algn="l">
+              <a:buFont typeface="+mj-lt"/>
+              <a:buAutoNum type="arabicPeriod"/>
+            </a:pPr>
+            <a:r>
               <a:rPr lang="en-US" dirty="0" smtClean="0">
                 <a:solidFill>
                   <a:schemeClr val="bg1"/>
@@ -4986,8 +5021,21 @@
                   <a:schemeClr val="bg1"/>
                 </a:solidFill>
               </a:rPr>
-              <a:t>(Server &amp; Client)</a:t>
-            </a:r>
+              <a:t>(Server &amp; Client</a:t>
+            </a:r>
+            <a:r>
+              <a:rPr lang="en-US" sz="2000" dirty="0" smtClean="0">
+                <a:solidFill>
+                  <a:schemeClr val="bg1"/>
+                </a:solidFill>
+              </a:rPr>
+              <a:t>)</a:t>
+            </a:r>
+            <a:endParaRPr lang="en-US" dirty="0" smtClean="0">
+              <a:solidFill>
+                <a:schemeClr val="bg1"/>
+              </a:solidFill>
+            </a:endParaRPr>
           </a:p>
           <a:p>
             <a:pPr marL="514350" indent="-514350" algn="l">

</xml_diff>